<commit_message>
deck updated the second time
</commit_message>
<xml_diff>
--- a/8weeksqlchallenge/Week1_Danny's_Diner/Case_Study1_queries_deck.pptx
+++ b/8weeksqlchallenge/Week1_Danny's_Diner/Case_Study1_queries_deck.pptx
@@ -117,13 +117,18 @@
       </a:defRPr>
     </a:lvl9pPr>
   </p:defaultTextStyle>
+  <p:extLst>
+    <p:ext uri="{EFAFB233-063F-42B5-8137-9DF3F51BA10A}">
+      <p15:sldGuideLst xmlns:p15="http://schemas.microsoft.com/office/powerpoint/2012/main"/>
+    </p:ext>
+  </p:extLst>
 </p:presentation>
 </file>
 
 <file path=ppt/revisionInfo.xml><?xml version="1.0" encoding="utf-8"?>
 <p1510:revInfo xmlns:a="http://schemas.openxmlformats.org/drawingml/2006/main" xmlns:r="http://schemas.openxmlformats.org/officeDocument/2006/relationships" xmlns:p1510="http://schemas.microsoft.com/office/powerpoint/2015/10/main">
   <p1510:revLst>
-    <p1510:client id="{024D7572-2CA5-4463-97A9-7C37D8D32B9A}" v="2" dt="2023-02-04T18:13:39.552"/>
+    <p1510:client id="{024D7572-2CA5-4463-97A9-7C37D8D32B9A}" v="4" dt="2023-02-04T18:27:31.114"/>
   </p1510:revLst>
 </p1510:revInfo>
 </file>
@@ -133,18 +138,18 @@
   <pc:docChgLst>
     <pc:chgData name="Odutayo Odufuwa" userId="9468010f401de36f" providerId="LiveId" clId="{024D7572-2CA5-4463-97A9-7C37D8D32B9A}"/>
     <pc:docChg chg="undo custSel modSld">
-      <pc:chgData name="Odutayo Odufuwa" userId="9468010f401de36f" providerId="LiveId" clId="{024D7572-2CA5-4463-97A9-7C37D8D32B9A}" dt="2023-02-04T18:13:41.197" v="63" actId="1076"/>
+      <pc:chgData name="Odutayo Odufuwa" userId="9468010f401de36f" providerId="LiveId" clId="{024D7572-2CA5-4463-97A9-7C37D8D32B9A}" dt="2023-02-04T18:28:24.833" v="98" actId="26606"/>
       <pc:docMkLst>
         <pc:docMk/>
       </pc:docMkLst>
       <pc:sldChg chg="addSp delSp modSp mod setBg setClrOvrMap">
-        <pc:chgData name="Odutayo Odufuwa" userId="9468010f401de36f" providerId="LiveId" clId="{024D7572-2CA5-4463-97A9-7C37D8D32B9A}" dt="2023-02-04T18:13:41.197" v="63" actId="1076"/>
+        <pc:chgData name="Odutayo Odufuwa" userId="9468010f401de36f" providerId="LiveId" clId="{024D7572-2CA5-4463-97A9-7C37D8D32B9A}" dt="2023-02-04T18:26:36.469" v="92" actId="1076"/>
         <pc:sldMkLst>
           <pc:docMk/>
           <pc:sldMk cId="2462046275" sldId="256"/>
         </pc:sldMkLst>
         <pc:spChg chg="mod ord">
-          <ac:chgData name="Odutayo Odufuwa" userId="9468010f401de36f" providerId="LiveId" clId="{024D7572-2CA5-4463-97A9-7C37D8D32B9A}" dt="2023-02-04T18:11:58.716" v="8" actId="27636"/>
+          <ac:chgData name="Odutayo Odufuwa" userId="9468010f401de36f" providerId="LiveId" clId="{024D7572-2CA5-4463-97A9-7C37D8D32B9A}" dt="2023-02-04T18:26:36.469" v="92" actId="1076"/>
           <ac:spMkLst>
             <pc:docMk/>
             <pc:sldMk cId="2462046275" sldId="256"/>
@@ -199,44 +204,400 @@
             <ac:spMk id="19" creationId="{1A89CBBC-7743-43D9-A324-25CB472E9B2E}"/>
           </ac:spMkLst>
         </pc:spChg>
-        <pc:spChg chg="add">
-          <ac:chgData name="Odutayo Odufuwa" userId="9468010f401de36f" providerId="LiveId" clId="{024D7572-2CA5-4463-97A9-7C37D8D32B9A}" dt="2023-02-04T18:11:52.027" v="5" actId="26606"/>
+        <pc:spChg chg="add del">
+          <ac:chgData name="Odutayo Odufuwa" userId="9468010f401de36f" providerId="LiveId" clId="{024D7572-2CA5-4463-97A9-7C37D8D32B9A}" dt="2023-02-04T18:24:20.907" v="64" actId="26606"/>
           <ac:spMkLst>
             <pc:docMk/>
             <pc:sldMk cId="2462046275" sldId="256"/>
             <ac:spMk id="24" creationId="{526E0BFB-CDF1-4990-8C11-AC849311E0A8}"/>
           </ac:spMkLst>
         </pc:spChg>
-        <pc:spChg chg="add">
-          <ac:chgData name="Odutayo Odufuwa" userId="9468010f401de36f" providerId="LiveId" clId="{024D7572-2CA5-4463-97A9-7C37D8D32B9A}" dt="2023-02-04T18:11:52.027" v="5" actId="26606"/>
+        <pc:spChg chg="add del">
+          <ac:chgData name="Odutayo Odufuwa" userId="9468010f401de36f" providerId="LiveId" clId="{024D7572-2CA5-4463-97A9-7C37D8D32B9A}" dt="2023-02-04T18:24:20.907" v="64" actId="26606"/>
           <ac:spMkLst>
             <pc:docMk/>
             <pc:sldMk cId="2462046275" sldId="256"/>
             <ac:spMk id="26" creationId="{6069A1F8-9BEB-4786-9694-FC48B2D75D21}"/>
           </ac:spMkLst>
         </pc:spChg>
-        <pc:spChg chg="add">
-          <ac:chgData name="Odutayo Odufuwa" userId="9468010f401de36f" providerId="LiveId" clId="{024D7572-2CA5-4463-97A9-7C37D8D32B9A}" dt="2023-02-04T18:11:52.027" v="5" actId="26606"/>
+        <pc:spChg chg="add del">
+          <ac:chgData name="Odutayo Odufuwa" userId="9468010f401de36f" providerId="LiveId" clId="{024D7572-2CA5-4463-97A9-7C37D8D32B9A}" dt="2023-02-04T18:24:20.907" v="64" actId="26606"/>
           <ac:spMkLst>
             <pc:docMk/>
             <pc:sldMk cId="2462046275" sldId="256"/>
             <ac:spMk id="28" creationId="{AF2F604E-43BE-4DC3-B983-E071523364F8}"/>
           </ac:spMkLst>
         </pc:spChg>
-        <pc:spChg chg="add">
-          <ac:chgData name="Odutayo Odufuwa" userId="9468010f401de36f" providerId="LiveId" clId="{024D7572-2CA5-4463-97A9-7C37D8D32B9A}" dt="2023-02-04T18:11:52.027" v="5" actId="26606"/>
+        <pc:spChg chg="add del">
+          <ac:chgData name="Odutayo Odufuwa" userId="9468010f401de36f" providerId="LiveId" clId="{024D7572-2CA5-4463-97A9-7C37D8D32B9A}" dt="2023-02-04T18:24:20.907" v="64" actId="26606"/>
           <ac:spMkLst>
             <pc:docMk/>
             <pc:sldMk cId="2462046275" sldId="256"/>
             <ac:spMk id="30" creationId="{08C9B587-E65E-4B52-B37C-ABEBB6E87928}"/>
           </ac:spMkLst>
         </pc:spChg>
-        <pc:picChg chg="mod">
-          <ac:chgData name="Odutayo Odufuwa" userId="9468010f401de36f" providerId="LiveId" clId="{024D7572-2CA5-4463-97A9-7C37D8D32B9A}" dt="2023-02-04T18:13:41.197" v="63" actId="1076"/>
+        <pc:spChg chg="add del">
+          <ac:chgData name="Odutayo Odufuwa" userId="9468010f401de36f" providerId="LiveId" clId="{024D7572-2CA5-4463-97A9-7C37D8D32B9A}" dt="2023-02-04T18:25:09.767" v="78" actId="26606"/>
+          <ac:spMkLst>
+            <pc:docMk/>
+            <pc:sldMk cId="2462046275" sldId="256"/>
+            <ac:spMk id="35" creationId="{3E443FD7-A66B-4AA0-872D-B088B9BC5F17}"/>
+          </ac:spMkLst>
+        </pc:spChg>
+        <pc:spChg chg="add del">
+          <ac:chgData name="Odutayo Odufuwa" userId="9468010f401de36f" providerId="LiveId" clId="{024D7572-2CA5-4463-97A9-7C37D8D32B9A}" dt="2023-02-04T18:25:09.767" v="78" actId="26606"/>
+          <ac:spMkLst>
+            <pc:docMk/>
+            <pc:sldMk cId="2462046275" sldId="256"/>
+            <ac:spMk id="37" creationId="{C04BE0EF-3561-49B4-9A29-F283168A91C7}"/>
+          </ac:spMkLst>
+        </pc:spChg>
+        <pc:spChg chg="add">
+          <ac:chgData name="Odutayo Odufuwa" userId="9468010f401de36f" providerId="LiveId" clId="{024D7572-2CA5-4463-97A9-7C37D8D32B9A}" dt="2023-02-04T18:25:09.767" v="78" actId="26606"/>
+          <ac:spMkLst>
+            <pc:docMk/>
+            <pc:sldMk cId="2462046275" sldId="256"/>
+            <ac:spMk id="42" creationId="{47942995-B07F-4636-9A06-C6A104B260A8}"/>
+          </ac:spMkLst>
+        </pc:spChg>
+        <pc:spChg chg="add">
+          <ac:chgData name="Odutayo Odufuwa" userId="9468010f401de36f" providerId="LiveId" clId="{024D7572-2CA5-4463-97A9-7C37D8D32B9A}" dt="2023-02-04T18:25:09.767" v="78" actId="26606"/>
+          <ac:spMkLst>
+            <pc:docMk/>
+            <pc:sldMk cId="2462046275" sldId="256"/>
+            <ac:spMk id="49" creationId="{B81933D1-5615-42C7-9C0B-4EB7105CCE2D}"/>
+          </ac:spMkLst>
+        </pc:spChg>
+        <pc:spChg chg="add">
+          <ac:chgData name="Odutayo Odufuwa" userId="9468010f401de36f" providerId="LiveId" clId="{024D7572-2CA5-4463-97A9-7C37D8D32B9A}" dt="2023-02-04T18:25:09.767" v="78" actId="26606"/>
+          <ac:spMkLst>
+            <pc:docMk/>
+            <pc:sldMk cId="2462046275" sldId="256"/>
+            <ac:spMk id="51" creationId="{19C9EAEA-39D0-4B0E-A0EB-51E7B26740B1}"/>
+          </ac:spMkLst>
+        </pc:spChg>
+        <pc:grpChg chg="add">
+          <ac:chgData name="Odutayo Odufuwa" userId="9468010f401de36f" providerId="LiveId" clId="{024D7572-2CA5-4463-97A9-7C37D8D32B9A}" dt="2023-02-04T18:25:09.767" v="78" actId="26606"/>
+          <ac:grpSpMkLst>
+            <pc:docMk/>
+            <pc:sldMk cId="2462046275" sldId="256"/>
+            <ac:grpSpMk id="44" creationId="{032D8612-31EB-44CF-A1D0-14FD4C705424}"/>
+          </ac:grpSpMkLst>
+        </pc:grpChg>
+        <pc:picChg chg="mod ord">
+          <ac:chgData name="Odutayo Odufuwa" userId="9468010f401de36f" providerId="LiveId" clId="{024D7572-2CA5-4463-97A9-7C37D8D32B9A}" dt="2023-02-04T18:25:09.767" v="78" actId="26606"/>
           <ac:picMkLst>
             <pc:docMk/>
             <pc:sldMk cId="2462046275" sldId="256"/>
             <ac:picMk id="5" creationId="{9CCD81F2-76E1-9DAD-9CDA-1C100FAEFBA2}"/>
+          </ac:picMkLst>
+        </pc:picChg>
+      </pc:sldChg>
+      <pc:sldChg chg="addSp delSp modSp mod">
+        <pc:chgData name="Odutayo Odufuwa" userId="9468010f401de36f" providerId="LiveId" clId="{024D7572-2CA5-4463-97A9-7C37D8D32B9A}" dt="2023-02-04T18:28:24.833" v="98" actId="26606"/>
+        <pc:sldMkLst>
+          <pc:docMk/>
+          <pc:sldMk cId="34581827" sldId="257"/>
+        </pc:sldMkLst>
+        <pc:spChg chg="mod">
+          <ac:chgData name="Odutayo Odufuwa" userId="9468010f401de36f" providerId="LiveId" clId="{024D7572-2CA5-4463-97A9-7C37D8D32B9A}" dt="2023-02-04T18:28:24.833" v="98" actId="26606"/>
+          <ac:spMkLst>
+            <pc:docMk/>
+            <pc:sldMk cId="34581827" sldId="257"/>
+            <ac:spMk id="2" creationId="{36CA5EE8-76A9-0A5C-C816-6CBFC72A2AE2}"/>
+          </ac:spMkLst>
+        </pc:spChg>
+        <pc:spChg chg="add del">
+          <ac:chgData name="Odutayo Odufuwa" userId="9468010f401de36f" providerId="LiveId" clId="{024D7572-2CA5-4463-97A9-7C37D8D32B9A}" dt="2023-02-04T18:28:24.833" v="98" actId="26606"/>
+          <ac:spMkLst>
+            <pc:docMk/>
+            <pc:sldMk cId="34581827" sldId="257"/>
+            <ac:spMk id="19" creationId="{823AC064-BC96-4F32-8AE1-B2FD38754823}"/>
+          </ac:spMkLst>
+        </pc:spChg>
+        <pc:spChg chg="add">
+          <ac:chgData name="Odutayo Odufuwa" userId="9468010f401de36f" providerId="LiveId" clId="{024D7572-2CA5-4463-97A9-7C37D8D32B9A}" dt="2023-02-04T18:28:24.833" v="98" actId="26606"/>
+          <ac:spMkLst>
+            <pc:docMk/>
+            <pc:sldMk cId="34581827" sldId="257"/>
+            <ac:spMk id="25" creationId="{71EC1228-8B00-4D31-8616-AAB846D68CEF}"/>
+          </ac:spMkLst>
+        </pc:spChg>
+        <pc:spChg chg="add">
+          <ac:chgData name="Odutayo Odufuwa" userId="9468010f401de36f" providerId="LiveId" clId="{024D7572-2CA5-4463-97A9-7C37D8D32B9A}" dt="2023-02-04T18:28:24.833" v="98" actId="26606"/>
+          <ac:spMkLst>
+            <pc:docMk/>
+            <pc:sldMk cId="34581827" sldId="257"/>
+            <ac:spMk id="26" creationId="{99413ED5-9ED4-4772-BCE4-2BCAE6B12E35}"/>
+          </ac:spMkLst>
+        </pc:spChg>
+        <pc:spChg chg="add del">
+          <ac:chgData name="Odutayo Odufuwa" userId="9468010f401de36f" providerId="LiveId" clId="{024D7572-2CA5-4463-97A9-7C37D8D32B9A}" dt="2023-02-04T18:26:55.679" v="94" actId="26606"/>
+          <ac:spMkLst>
+            <pc:docMk/>
+            <pc:sldMk cId="34581827" sldId="257"/>
+            <ac:spMk id="28" creationId="{E18F6E8B-15ED-43C7-94BA-91549A651C73}"/>
+          </ac:spMkLst>
+        </pc:spChg>
+        <pc:spChg chg="add">
+          <ac:chgData name="Odutayo Odufuwa" userId="9468010f401de36f" providerId="LiveId" clId="{024D7572-2CA5-4463-97A9-7C37D8D32B9A}" dt="2023-02-04T18:28:24.833" v="98" actId="26606"/>
+          <ac:spMkLst>
+            <pc:docMk/>
+            <pc:sldMk cId="34581827" sldId="257"/>
+            <ac:spMk id="32" creationId="{04357C93-F0CB-4A1C-8F77-4E9063789819}"/>
+          </ac:spMkLst>
+        </pc:spChg>
+        <pc:spChg chg="add">
+          <ac:chgData name="Odutayo Odufuwa" userId="9468010f401de36f" providerId="LiveId" clId="{024D7572-2CA5-4463-97A9-7C37D8D32B9A}" dt="2023-02-04T18:28:24.833" v="98" actId="26606"/>
+          <ac:spMkLst>
+            <pc:docMk/>
+            <pc:sldMk cId="34581827" sldId="257"/>
+            <ac:spMk id="34" creationId="{90F533E9-6690-41A8-A372-4C6C622D028D}"/>
+          </ac:spMkLst>
+        </pc:spChg>
+        <pc:spChg chg="add del">
+          <ac:chgData name="Odutayo Odufuwa" userId="9468010f401de36f" providerId="LiveId" clId="{024D7572-2CA5-4463-97A9-7C37D8D32B9A}" dt="2023-02-04T18:26:55.679" v="94" actId="26606"/>
+          <ac:spMkLst>
+            <pc:docMk/>
+            <pc:sldMk cId="34581827" sldId="257"/>
+            <ac:spMk id="35" creationId="{B81933D1-5615-42C7-9C0B-4EB7105CCE2D}"/>
+          </ac:spMkLst>
+        </pc:spChg>
+        <pc:spChg chg="add del">
+          <ac:chgData name="Odutayo Odufuwa" userId="9468010f401de36f" providerId="LiveId" clId="{024D7572-2CA5-4463-97A9-7C37D8D32B9A}" dt="2023-02-04T18:26:55.679" v="94" actId="26606"/>
+          <ac:spMkLst>
+            <pc:docMk/>
+            <pc:sldMk cId="34581827" sldId="257"/>
+            <ac:spMk id="37" creationId="{B089A89A-1E9C-4761-9DFF-53C275FBF870}"/>
+          </ac:spMkLst>
+        </pc:spChg>
+        <pc:spChg chg="add del">
+          <ac:chgData name="Odutayo Odufuwa" userId="9468010f401de36f" providerId="LiveId" clId="{024D7572-2CA5-4463-97A9-7C37D8D32B9A}" dt="2023-02-04T18:26:55.679" v="94" actId="26606"/>
+          <ac:spMkLst>
+            <pc:docMk/>
+            <pc:sldMk cId="34581827" sldId="257"/>
+            <ac:spMk id="39" creationId="{19C9EAEA-39D0-4B0E-A0EB-51E7B26740B1}"/>
+          </ac:spMkLst>
+        </pc:spChg>
+        <pc:grpChg chg="add del">
+          <ac:chgData name="Odutayo Odufuwa" userId="9468010f401de36f" providerId="LiveId" clId="{024D7572-2CA5-4463-97A9-7C37D8D32B9A}" dt="2023-02-04T18:26:55.679" v="94" actId="26606"/>
+          <ac:grpSpMkLst>
+            <pc:docMk/>
+            <pc:sldMk cId="34581827" sldId="257"/>
+            <ac:grpSpMk id="30" creationId="{032D8612-31EB-44CF-A1D0-14FD4C705424}"/>
+          </ac:grpSpMkLst>
+        </pc:grpChg>
+        <pc:picChg chg="mod">
+          <ac:chgData name="Odutayo Odufuwa" userId="9468010f401de36f" providerId="LiveId" clId="{024D7572-2CA5-4463-97A9-7C37D8D32B9A}" dt="2023-02-04T18:28:24.833" v="98" actId="26606"/>
+          <ac:picMkLst>
+            <pc:docMk/>
+            <pc:sldMk cId="34581827" sldId="257"/>
+            <ac:picMk id="5" creationId="{573ED031-399F-E7C7-47BB-C81FD6FE5509}"/>
+          </ac:picMkLst>
+        </pc:picChg>
+        <pc:picChg chg="mod">
+          <ac:chgData name="Odutayo Odufuwa" userId="9468010f401de36f" providerId="LiveId" clId="{024D7572-2CA5-4463-97A9-7C37D8D32B9A}" dt="2023-02-04T18:28:24.833" v="98" actId="26606"/>
+          <ac:picMkLst>
+            <pc:docMk/>
+            <pc:sldMk cId="34581827" sldId="257"/>
+            <ac:picMk id="7" creationId="{ECF6A27A-67BC-18A4-7A0E-B4404FF8E3DB}"/>
+          </ac:picMkLst>
+        </pc:picChg>
+        <pc:cxnChg chg="add del">
+          <ac:chgData name="Odutayo Odufuwa" userId="9468010f401de36f" providerId="LiveId" clId="{024D7572-2CA5-4463-97A9-7C37D8D32B9A}" dt="2023-02-04T18:28:24.833" v="98" actId="26606"/>
+          <ac:cxnSpMkLst>
+            <pc:docMk/>
+            <pc:sldMk cId="34581827" sldId="257"/>
+            <ac:cxnSpMk id="21" creationId="{7E7C77BC-7138-40B1-A15B-20F57A494629}"/>
+          </ac:cxnSpMkLst>
+        </pc:cxnChg>
+        <pc:cxnChg chg="add del">
+          <ac:chgData name="Odutayo Odufuwa" userId="9468010f401de36f" providerId="LiveId" clId="{024D7572-2CA5-4463-97A9-7C37D8D32B9A}" dt="2023-02-04T18:28:24.833" v="98" actId="26606"/>
+          <ac:cxnSpMkLst>
+            <pc:docMk/>
+            <pc:sldMk cId="34581827" sldId="257"/>
+            <ac:cxnSpMk id="23" creationId="{DB146403-F3D6-484B-B2ED-97F9565D0370}"/>
+          </ac:cxnSpMkLst>
+        </pc:cxnChg>
+      </pc:sldChg>
+      <pc:sldChg chg="setBg">
+        <pc:chgData name="Odutayo Odufuwa" userId="9468010f401de36f" providerId="LiveId" clId="{024D7572-2CA5-4463-97A9-7C37D8D32B9A}" dt="2023-02-04T18:27:31.098" v="95"/>
+        <pc:sldMkLst>
+          <pc:docMk/>
+          <pc:sldMk cId="3552328073" sldId="258"/>
+        </pc:sldMkLst>
+      </pc:sldChg>
+      <pc:sldChg chg="addSp delSp modSp mod setClrOvrMap">
+        <pc:chgData name="Odutayo Odufuwa" userId="9468010f401de36f" providerId="LiveId" clId="{024D7572-2CA5-4463-97A9-7C37D8D32B9A}" dt="2023-02-04T18:28:06.632" v="97" actId="26606"/>
+        <pc:sldMkLst>
+          <pc:docMk/>
+          <pc:sldMk cId="3271251543" sldId="268"/>
+        </pc:sldMkLst>
+        <pc:spChg chg="mod">
+          <ac:chgData name="Odutayo Odufuwa" userId="9468010f401de36f" providerId="LiveId" clId="{024D7572-2CA5-4463-97A9-7C37D8D32B9A}" dt="2023-02-04T18:28:06.632" v="97" actId="26606"/>
+          <ac:spMkLst>
+            <pc:docMk/>
+            <pc:sldMk cId="3271251543" sldId="268"/>
+            <ac:spMk id="2" creationId="{C78CF67C-3804-F0E4-FB4A-1F9996E3AB00}"/>
+          </ac:spMkLst>
+        </pc:spChg>
+        <pc:spChg chg="del">
+          <ac:chgData name="Odutayo Odufuwa" userId="9468010f401de36f" providerId="LiveId" clId="{024D7572-2CA5-4463-97A9-7C37D8D32B9A}" dt="2023-02-04T18:28:06.632" v="97" actId="26606"/>
+          <ac:spMkLst>
+            <pc:docMk/>
+            <pc:sldMk cId="3271251543" sldId="268"/>
+            <ac:spMk id="8" creationId="{0671A8AE-40A1-4631-A6B8-581AFF065482}"/>
+          </ac:spMkLst>
+        </pc:spChg>
+        <pc:spChg chg="del">
+          <ac:chgData name="Odutayo Odufuwa" userId="9468010f401de36f" providerId="LiveId" clId="{024D7572-2CA5-4463-97A9-7C37D8D32B9A}" dt="2023-02-04T18:28:06.632" v="97" actId="26606"/>
+          <ac:spMkLst>
+            <pc:docMk/>
+            <pc:sldMk cId="3271251543" sldId="268"/>
+            <ac:spMk id="11" creationId="{AB58EF07-17C2-48CF-ABB0-EEF1F17CB8F0}"/>
+          </ac:spMkLst>
+        </pc:spChg>
+        <pc:spChg chg="del">
+          <ac:chgData name="Odutayo Odufuwa" userId="9468010f401de36f" providerId="LiveId" clId="{024D7572-2CA5-4463-97A9-7C37D8D32B9A}" dt="2023-02-04T18:28:06.632" v="97" actId="26606"/>
+          <ac:spMkLst>
+            <pc:docMk/>
+            <pc:sldMk cId="3271251543" sldId="268"/>
+            <ac:spMk id="12" creationId="{AF2F604E-43BE-4DC3-B983-E071523364F8}"/>
+          </ac:spMkLst>
+        </pc:spChg>
+        <pc:spChg chg="del">
+          <ac:chgData name="Odutayo Odufuwa" userId="9468010f401de36f" providerId="LiveId" clId="{024D7572-2CA5-4463-97A9-7C37D8D32B9A}" dt="2023-02-04T18:28:06.632" v="97" actId="26606"/>
+          <ac:spMkLst>
+            <pc:docMk/>
+            <pc:sldMk cId="3271251543" sldId="268"/>
+            <ac:spMk id="14" creationId="{08C9B587-E65E-4B52-B37C-ABEBB6E87928}"/>
+          </ac:spMkLst>
+        </pc:spChg>
+        <pc:spChg chg="add">
+          <ac:chgData name="Odutayo Odufuwa" userId="9468010f401de36f" providerId="LiveId" clId="{024D7572-2CA5-4463-97A9-7C37D8D32B9A}" dt="2023-02-04T18:28:06.632" v="97" actId="26606"/>
+          <ac:spMkLst>
+            <pc:docMk/>
+            <pc:sldMk cId="3271251543" sldId="268"/>
+            <ac:spMk id="19" creationId="{47942995-B07F-4636-9A06-C6A104B260A8}"/>
+          </ac:spMkLst>
+        </pc:spChg>
+        <pc:spChg chg="add">
+          <ac:chgData name="Odutayo Odufuwa" userId="9468010f401de36f" providerId="LiveId" clId="{024D7572-2CA5-4463-97A9-7C37D8D32B9A}" dt="2023-02-04T18:28:06.632" v="97" actId="26606"/>
+          <ac:spMkLst>
+            <pc:docMk/>
+            <pc:sldMk cId="3271251543" sldId="268"/>
+            <ac:spMk id="26" creationId="{B81933D1-5615-42C7-9C0B-4EB7105CCE2D}"/>
+          </ac:spMkLst>
+        </pc:spChg>
+        <pc:spChg chg="add">
+          <ac:chgData name="Odutayo Odufuwa" userId="9468010f401de36f" providerId="LiveId" clId="{024D7572-2CA5-4463-97A9-7C37D8D32B9A}" dt="2023-02-04T18:28:06.632" v="97" actId="26606"/>
+          <ac:spMkLst>
+            <pc:docMk/>
+            <pc:sldMk cId="3271251543" sldId="268"/>
+            <ac:spMk id="28" creationId="{19C9EAEA-39D0-4B0E-A0EB-51E7B26740B1}"/>
+          </ac:spMkLst>
+        </pc:spChg>
+        <pc:grpChg chg="add">
+          <ac:chgData name="Odutayo Odufuwa" userId="9468010f401de36f" providerId="LiveId" clId="{024D7572-2CA5-4463-97A9-7C37D8D32B9A}" dt="2023-02-04T18:28:06.632" v="97" actId="26606"/>
+          <ac:grpSpMkLst>
+            <pc:docMk/>
+            <pc:sldMk cId="3271251543" sldId="268"/>
+            <ac:grpSpMk id="21" creationId="{032D8612-31EB-44CF-A1D0-14FD4C705424}"/>
+          </ac:grpSpMkLst>
+        </pc:grpChg>
+        <pc:picChg chg="mod ord">
+          <ac:chgData name="Odutayo Odufuwa" userId="9468010f401de36f" providerId="LiveId" clId="{024D7572-2CA5-4463-97A9-7C37D8D32B9A}" dt="2023-02-04T18:28:06.632" v="97" actId="26606"/>
+          <ac:picMkLst>
+            <pc:docMk/>
+            <pc:sldMk cId="3271251543" sldId="268"/>
+            <ac:picMk id="4" creationId="{0E937CD3-8B80-264B-E56E-EC0BE557EAFC}"/>
+          </ac:picMkLst>
+        </pc:picChg>
+      </pc:sldChg>
+      <pc:sldChg chg="addSp delSp modSp mod setClrOvrMap">
+        <pc:chgData name="Odutayo Odufuwa" userId="9468010f401de36f" providerId="LiveId" clId="{024D7572-2CA5-4463-97A9-7C37D8D32B9A}" dt="2023-02-04T18:27:57.182" v="96" actId="26606"/>
+        <pc:sldMkLst>
+          <pc:docMk/>
+          <pc:sldMk cId="1589373550" sldId="278"/>
+        </pc:sldMkLst>
+        <pc:spChg chg="mod">
+          <ac:chgData name="Odutayo Odufuwa" userId="9468010f401de36f" providerId="LiveId" clId="{024D7572-2CA5-4463-97A9-7C37D8D32B9A}" dt="2023-02-04T18:27:57.182" v="96" actId="26606"/>
+          <ac:spMkLst>
+            <pc:docMk/>
+            <pc:sldMk cId="1589373550" sldId="278"/>
+            <ac:spMk id="2" creationId="{7B71D3B0-BE5B-FC78-6E86-FC9E6281B0F9}"/>
+          </ac:spMkLst>
+        </pc:spChg>
+        <pc:spChg chg="del">
+          <ac:chgData name="Odutayo Odufuwa" userId="9468010f401de36f" providerId="LiveId" clId="{024D7572-2CA5-4463-97A9-7C37D8D32B9A}" dt="2023-02-04T18:27:57.182" v="96" actId="26606"/>
+          <ac:spMkLst>
+            <pc:docMk/>
+            <pc:sldMk cId="1589373550" sldId="278"/>
+            <ac:spMk id="8" creationId="{0671A8AE-40A1-4631-A6B8-581AFF065482}"/>
+          </ac:spMkLst>
+        </pc:spChg>
+        <pc:spChg chg="del">
+          <ac:chgData name="Odutayo Odufuwa" userId="9468010f401de36f" providerId="LiveId" clId="{024D7572-2CA5-4463-97A9-7C37D8D32B9A}" dt="2023-02-04T18:27:57.182" v="96" actId="26606"/>
+          <ac:spMkLst>
+            <pc:docMk/>
+            <pc:sldMk cId="1589373550" sldId="278"/>
+            <ac:spMk id="10" creationId="{AB58EF07-17C2-48CF-ABB0-EEF1F17CB8F0}"/>
+          </ac:spMkLst>
+        </pc:spChg>
+        <pc:spChg chg="del">
+          <ac:chgData name="Odutayo Odufuwa" userId="9468010f401de36f" providerId="LiveId" clId="{024D7572-2CA5-4463-97A9-7C37D8D32B9A}" dt="2023-02-04T18:27:57.182" v="96" actId="26606"/>
+          <ac:spMkLst>
+            <pc:docMk/>
+            <pc:sldMk cId="1589373550" sldId="278"/>
+            <ac:spMk id="12" creationId="{AF2F604E-43BE-4DC3-B983-E071523364F8}"/>
+          </ac:spMkLst>
+        </pc:spChg>
+        <pc:spChg chg="del">
+          <ac:chgData name="Odutayo Odufuwa" userId="9468010f401de36f" providerId="LiveId" clId="{024D7572-2CA5-4463-97A9-7C37D8D32B9A}" dt="2023-02-04T18:27:57.182" v="96" actId="26606"/>
+          <ac:spMkLst>
+            <pc:docMk/>
+            <pc:sldMk cId="1589373550" sldId="278"/>
+            <ac:spMk id="14" creationId="{08C9B587-E65E-4B52-B37C-ABEBB6E87928}"/>
+          </ac:spMkLst>
+        </pc:spChg>
+        <pc:spChg chg="add">
+          <ac:chgData name="Odutayo Odufuwa" userId="9468010f401de36f" providerId="LiveId" clId="{024D7572-2CA5-4463-97A9-7C37D8D32B9A}" dt="2023-02-04T18:27:57.182" v="96" actId="26606"/>
+          <ac:spMkLst>
+            <pc:docMk/>
+            <pc:sldMk cId="1589373550" sldId="278"/>
+            <ac:spMk id="19" creationId="{47942995-B07F-4636-9A06-C6A104B260A8}"/>
+          </ac:spMkLst>
+        </pc:spChg>
+        <pc:spChg chg="add">
+          <ac:chgData name="Odutayo Odufuwa" userId="9468010f401de36f" providerId="LiveId" clId="{024D7572-2CA5-4463-97A9-7C37D8D32B9A}" dt="2023-02-04T18:27:57.182" v="96" actId="26606"/>
+          <ac:spMkLst>
+            <pc:docMk/>
+            <pc:sldMk cId="1589373550" sldId="278"/>
+            <ac:spMk id="26" creationId="{B81933D1-5615-42C7-9C0B-4EB7105CCE2D}"/>
+          </ac:spMkLst>
+        </pc:spChg>
+        <pc:spChg chg="add">
+          <ac:chgData name="Odutayo Odufuwa" userId="9468010f401de36f" providerId="LiveId" clId="{024D7572-2CA5-4463-97A9-7C37D8D32B9A}" dt="2023-02-04T18:27:57.182" v="96" actId="26606"/>
+          <ac:spMkLst>
+            <pc:docMk/>
+            <pc:sldMk cId="1589373550" sldId="278"/>
+            <ac:spMk id="28" creationId="{19C9EAEA-39D0-4B0E-A0EB-51E7B26740B1}"/>
+          </ac:spMkLst>
+        </pc:spChg>
+        <pc:grpChg chg="add">
+          <ac:chgData name="Odutayo Odufuwa" userId="9468010f401de36f" providerId="LiveId" clId="{024D7572-2CA5-4463-97A9-7C37D8D32B9A}" dt="2023-02-04T18:27:57.182" v="96" actId="26606"/>
+          <ac:grpSpMkLst>
+            <pc:docMk/>
+            <pc:sldMk cId="1589373550" sldId="278"/>
+            <ac:grpSpMk id="21" creationId="{032D8612-31EB-44CF-A1D0-14FD4C705424}"/>
+          </ac:grpSpMkLst>
+        </pc:grpChg>
+        <pc:picChg chg="mod ord">
+          <ac:chgData name="Odutayo Odufuwa" userId="9468010f401de36f" providerId="LiveId" clId="{024D7572-2CA5-4463-97A9-7C37D8D32B9A}" dt="2023-02-04T18:27:57.182" v="96" actId="26606"/>
+          <ac:picMkLst>
+            <pc:docMk/>
+            <pc:sldMk cId="1589373550" sldId="278"/>
+            <ac:picMk id="4" creationId="{0A1FA50B-6EF5-90B6-8A07-65958175C533}"/>
           </ac:picMkLst>
         </pc:picChg>
       </pc:sldChg>
@@ -394,7 +755,7 @@
           <a:p>
             <a:fld id="{3F0FEB60-3B6E-4B85-9C07-6391BE071871}" type="datetimeFigureOut">
               <a:rPr lang="en-NG" smtClean="0"/>
-              <a:t>02/02/2023</a:t>
+              <a:t>04/02/2023</a:t>
             </a:fld>
             <a:endParaRPr lang="en-NG"/>
           </a:p>
@@ -594,7 +955,7 @@
           <a:p>
             <a:fld id="{3F0FEB60-3B6E-4B85-9C07-6391BE071871}" type="datetimeFigureOut">
               <a:rPr lang="en-NG" smtClean="0"/>
-              <a:t>02/02/2023</a:t>
+              <a:t>04/02/2023</a:t>
             </a:fld>
             <a:endParaRPr lang="en-NG"/>
           </a:p>
@@ -804,7 +1165,7 @@
           <a:p>
             <a:fld id="{3F0FEB60-3B6E-4B85-9C07-6391BE071871}" type="datetimeFigureOut">
               <a:rPr lang="en-NG" smtClean="0"/>
-              <a:t>02/02/2023</a:t>
+              <a:t>04/02/2023</a:t>
             </a:fld>
             <a:endParaRPr lang="en-NG"/>
           </a:p>
@@ -1004,7 +1365,7 @@
           <a:p>
             <a:fld id="{3F0FEB60-3B6E-4B85-9C07-6391BE071871}" type="datetimeFigureOut">
               <a:rPr lang="en-NG" smtClean="0"/>
-              <a:t>02/02/2023</a:t>
+              <a:t>04/02/2023</a:t>
             </a:fld>
             <a:endParaRPr lang="en-NG"/>
           </a:p>
@@ -1280,7 +1641,7 @@
           <a:p>
             <a:fld id="{3F0FEB60-3B6E-4B85-9C07-6391BE071871}" type="datetimeFigureOut">
               <a:rPr lang="en-NG" smtClean="0"/>
-              <a:t>02/02/2023</a:t>
+              <a:t>04/02/2023</a:t>
             </a:fld>
             <a:endParaRPr lang="en-NG"/>
           </a:p>
@@ -1548,7 +1909,7 @@
           <a:p>
             <a:fld id="{3F0FEB60-3B6E-4B85-9C07-6391BE071871}" type="datetimeFigureOut">
               <a:rPr lang="en-NG" smtClean="0"/>
-              <a:t>02/02/2023</a:t>
+              <a:t>04/02/2023</a:t>
             </a:fld>
             <a:endParaRPr lang="en-NG"/>
           </a:p>
@@ -1963,7 +2324,7 @@
           <a:p>
             <a:fld id="{3F0FEB60-3B6E-4B85-9C07-6391BE071871}" type="datetimeFigureOut">
               <a:rPr lang="en-NG" smtClean="0"/>
-              <a:t>02/02/2023</a:t>
+              <a:t>04/02/2023</a:t>
             </a:fld>
             <a:endParaRPr lang="en-NG"/>
           </a:p>
@@ -2105,7 +2466,7 @@
           <a:p>
             <a:fld id="{3F0FEB60-3B6E-4B85-9C07-6391BE071871}" type="datetimeFigureOut">
               <a:rPr lang="en-NG" smtClean="0"/>
-              <a:t>02/02/2023</a:t>
+              <a:t>04/02/2023</a:t>
             </a:fld>
             <a:endParaRPr lang="en-NG"/>
           </a:p>
@@ -2218,7 +2579,7 @@
           <a:p>
             <a:fld id="{3F0FEB60-3B6E-4B85-9C07-6391BE071871}" type="datetimeFigureOut">
               <a:rPr lang="en-NG" smtClean="0"/>
-              <a:t>02/02/2023</a:t>
+              <a:t>04/02/2023</a:t>
             </a:fld>
             <a:endParaRPr lang="en-NG"/>
           </a:p>
@@ -2531,7 +2892,7 @@
           <a:p>
             <a:fld id="{3F0FEB60-3B6E-4B85-9C07-6391BE071871}" type="datetimeFigureOut">
               <a:rPr lang="en-NG" smtClean="0"/>
-              <a:t>02/02/2023</a:t>
+              <a:t>04/02/2023</a:t>
             </a:fld>
             <a:endParaRPr lang="en-NG"/>
           </a:p>
@@ -2820,7 +3181,7 @@
           <a:p>
             <a:fld id="{3F0FEB60-3B6E-4B85-9C07-6391BE071871}" type="datetimeFigureOut">
               <a:rPr lang="en-NG" smtClean="0"/>
-              <a:t>02/02/2023</a:t>
+              <a:t>04/02/2023</a:t>
             </a:fld>
             <a:endParaRPr lang="en-NG"/>
           </a:p>
@@ -3063,7 +3424,7 @@
           <a:p>
             <a:fld id="{3F0FEB60-3B6E-4B85-9C07-6391BE071871}" type="datetimeFigureOut">
               <a:rPr lang="en-NG" smtClean="0"/>
-              <a:t>02/02/2023</a:t>
+              <a:t>04/02/2023</a:t>
             </a:fld>
             <a:endParaRPr lang="en-NG"/>
           </a:p>
@@ -3490,10 +3851,10 @@
       </p:grpSpPr>
       <p:sp useBgFill="1">
         <p:nvSpPr>
-          <p:cNvPr id="24" name="Rectangle 23">
-            <a:extLst>
-              <a:ext uri="{FF2B5EF4-FFF2-40B4-BE49-F238E27FC236}">
-                <a16:creationId xmlns:a16="http://schemas.microsoft.com/office/drawing/2014/main" id="{526E0BFB-CDF1-4990-8C11-AC849311E0A8}"/>
+          <p:cNvPr id="42" name="Rectangle 41">
+            <a:extLst>
+              <a:ext uri="{FF2B5EF4-FFF2-40B4-BE49-F238E27FC236}">
+                <a16:creationId xmlns:a16="http://schemas.microsoft.com/office/drawing/2014/main" id="{47942995-B07F-4636-9A06-C6A104B260A8}"/>
               </a:ext>
               <a:ext uri="{C183D7F6-B498-43B3-948B-1728B52AA6E4}">
                 <adec:decorative xmlns:adec="http://schemas.microsoft.com/office/drawing/2017/decorative" val="1"/>
@@ -3514,7 +3875,7 @@
         <p:spPr>
           <a:xfrm>
             <a:off x="0" y="0"/>
-            <a:ext cx="12192000" cy="6858000"/>
+            <a:ext cx="12191999" cy="6857365"/>
           </a:xfrm>
           <a:prstGeom prst="rect">
             <a:avLst/>
@@ -3548,56 +3909,74 @@
           </a:p>
         </p:txBody>
       </p:sp>
-      <p:pic>
-        <p:nvPicPr>
-          <p:cNvPr id="5" name="Picture 4">
-            <a:extLst>
-              <a:ext uri="{FF2B5EF4-FFF2-40B4-BE49-F238E27FC236}">
-                <a16:creationId xmlns:a16="http://schemas.microsoft.com/office/drawing/2014/main" id="{9CCD81F2-76E1-9DAD-9CDA-1C100FAEFBA2}"/>
-              </a:ext>
-            </a:extLst>
-          </p:cNvPr>
-          <p:cNvPicPr>
-            <a:picLocks noChangeAspect="1"/>
-          </p:cNvPicPr>
-          <p:nvPr/>
-        </p:nvPicPr>
-        <p:blipFill rotWithShape="1">
-          <a:blip r:embed="rId2">
-            <a:extLst>
-              <a:ext uri="{28A0092B-C50C-407E-A947-70E740481C1C}">
-                <a14:useLocalDpi xmlns:a14="http://schemas.microsoft.com/office/drawing/2010/main" val="0"/>
-              </a:ext>
-            </a:extLst>
-          </a:blip>
-          <a:srcRect l="9091" t="18558" r="-2" b="9339"/>
-          <a:stretch/>
-        </p:blipFill>
-        <p:spPr>
-          <a:xfrm>
-            <a:off x="-16186" y="-113278"/>
-            <a:ext cx="8668512" cy="6857990"/>
-          </a:xfrm>
-          <a:prstGeom prst="rect">
-            <a:avLst/>
-          </a:prstGeom>
-        </p:spPr>
-      </p:pic>
-      <p:sp>
-        <p:nvSpPr>
-          <p:cNvPr id="26" name="Rectangle 25">
-            <a:extLst>
-              <a:ext uri="{FF2B5EF4-FFF2-40B4-BE49-F238E27FC236}">
-                <a16:creationId xmlns:a16="http://schemas.microsoft.com/office/drawing/2014/main" id="{6069A1F8-9BEB-4786-9694-FC48B2D75D21}"/>
+      <p:sp>
+        <p:nvSpPr>
+          <p:cNvPr id="3" name="Subtitle 2">
+            <a:extLst>
+              <a:ext uri="{FF2B5EF4-FFF2-40B4-BE49-F238E27FC236}">
+                <a16:creationId xmlns:a16="http://schemas.microsoft.com/office/drawing/2014/main" id="{2A306314-F751-53CC-EF3D-C5DA348E5008}"/>
+              </a:ext>
+            </a:extLst>
+          </p:cNvPr>
+          <p:cNvSpPr>
+            <a:spLocks noGrp="1"/>
+          </p:cNvSpPr>
+          <p:nvPr>
+            <p:ph type="subTitle" idx="1"/>
+          </p:nvPr>
+        </p:nvSpPr>
+        <p:spPr>
+          <a:xfrm>
+            <a:off x="0" y="3658452"/>
+            <a:ext cx="4178798" cy="1261457"/>
+          </a:xfrm>
+        </p:spPr>
+        <p:txBody>
+          <a:bodyPr vert="horz" lIns="91440" tIns="45720" rIns="91440" bIns="45720" rtlCol="0" anchor="b">
+            <a:normAutofit fontScale="77500" lnSpcReduction="20000"/>
+          </a:bodyPr>
+          <a:lstStyle/>
+          <a:p>
+            <a:pPr algn="l"/>
+            <a:r>
+              <a:rPr lang="en-US" sz="5400" kern="1200" dirty="0">
+                <a:solidFill>
+                  <a:schemeClr val="tx1"/>
+                </a:solidFill>
+                <a:latin typeface="Garamond" panose="02020404030301010803" pitchFamily="18" charset="0"/>
+              </a:rPr>
+              <a:t>By</a:t>
+            </a:r>
+          </a:p>
+          <a:p>
+            <a:pPr algn="l"/>
+            <a:r>
+              <a:rPr lang="en-US" sz="5400" kern="1200" dirty="0">
+                <a:solidFill>
+                  <a:schemeClr val="tx1"/>
+                </a:solidFill>
+                <a:latin typeface="Garamond" panose="02020404030301010803" pitchFamily="18" charset="0"/>
+              </a:rPr>
+              <a:t>Odutayo Odufuwa</a:t>
+            </a:r>
+          </a:p>
+        </p:txBody>
+      </p:sp>
+      <p:grpSp>
+        <p:nvGrpSpPr>
+          <p:cNvPr id="44" name="Group 43">
+            <a:extLst>
+              <a:ext uri="{FF2B5EF4-FFF2-40B4-BE49-F238E27FC236}">
+                <a16:creationId xmlns:a16="http://schemas.microsoft.com/office/drawing/2014/main" id="{032D8612-31EB-44CF-A1D0-14FD4C705424}"/>
               </a:ext>
               <a:ext uri="{C183D7F6-B498-43B3-948B-1728B52AA6E4}">
                 <adec:decorative xmlns:adec="http://schemas.microsoft.com/office/drawing/2017/decorative" val="1"/>
               </a:ext>
             </a:extLst>
           </p:cNvPr>
-          <p:cNvSpPr>
-            <a:spLocks noGrp="1" noRot="1" noChangeAspect="1" noMove="1" noResize="1" noEditPoints="1" noAdjustHandles="1" noChangeArrowheads="1" noChangeShapeType="1" noTextEdit="1"/>
-          </p:cNvSpPr>
+          <p:cNvGrpSpPr>
+            <a:grpSpLocks noGrp="1" noUngrp="1" noRot="1" noChangeAspect="1" noMove="1" noResize="1"/>
+          </p:cNvGrpSpPr>
           <p:nvPr>
             <p:extLst>
               <p:ext uri="{386F3935-93C4-4BCD-93E2-E3B085C9AB24}">
@@ -3605,36 +3984,230 @@
               </p:ext>
             </p:extLst>
           </p:nvPr>
+        </p:nvGrpSpPr>
+        <p:grpSpPr>
+          <a:xfrm>
+            <a:off x="0" y="2984992"/>
+            <a:ext cx="731521" cy="673460"/>
+            <a:chOff x="3940602" y="308034"/>
+            <a:chExt cx="2116791" cy="3428999"/>
+          </a:xfrm>
+          <a:solidFill>
+            <a:schemeClr val="accent4"/>
+          </a:solidFill>
+        </p:grpSpPr>
+        <p:sp>
+          <p:nvSpPr>
+            <p:cNvPr id="45" name="Rectangle 44">
+              <a:extLst>
+                <a:ext uri="{FF2B5EF4-FFF2-40B4-BE49-F238E27FC236}">
+                  <a16:creationId xmlns:a16="http://schemas.microsoft.com/office/drawing/2014/main" id="{F19A4A0F-1B59-4DB0-9764-D10936E98770}"/>
+                </a:ext>
+                <a:ext uri="{C183D7F6-B498-43B3-948B-1728B52AA6E4}">
+                  <adec:decorative xmlns:adec="http://schemas.microsoft.com/office/drawing/2017/decorative" val="1"/>
+                </a:ext>
+              </a:extLst>
+            </p:cNvPr>
+            <p:cNvSpPr/>
+            <p:nvPr>
+              <p:extLst>
+                <p:ext uri="{386F3935-93C4-4BCD-93E2-E3B085C9AB24}">
+                  <p16:designElem xmlns:p16="http://schemas.microsoft.com/office/powerpoint/2015/main" val="1"/>
+                </p:ext>
+              </p:extLst>
+            </p:nvPr>
+          </p:nvSpPr>
+          <p:spPr>
+            <a:xfrm>
+              <a:off x="3940602" y="308034"/>
+              <a:ext cx="566743" cy="3428999"/>
+            </a:xfrm>
+            <a:prstGeom prst="rect">
+              <a:avLst/>
+            </a:prstGeom>
+            <a:grpFill/>
+            <a:ln>
+              <a:noFill/>
+            </a:ln>
+          </p:spPr>
+          <p:style>
+            <a:lnRef idx="2">
+              <a:schemeClr val="accent1">
+                <a:shade val="50000"/>
+              </a:schemeClr>
+            </a:lnRef>
+            <a:fillRef idx="1">
+              <a:schemeClr val="accent1"/>
+            </a:fillRef>
+            <a:effectRef idx="0">
+              <a:schemeClr val="accent1"/>
+            </a:effectRef>
+            <a:fontRef idx="minor">
+              <a:schemeClr val="lt1"/>
+            </a:fontRef>
+          </p:style>
+          <p:txBody>
+            <a:bodyPr rtlCol="0" anchor="ctr"/>
+            <a:lstStyle/>
+            <a:p>
+              <a:pPr algn="ctr"/>
+              <a:endParaRPr lang="en-US"/>
+            </a:p>
+          </p:txBody>
+        </p:sp>
+        <p:sp>
+          <p:nvSpPr>
+            <p:cNvPr id="46" name="Rectangle 45">
+              <a:extLst>
+                <a:ext uri="{FF2B5EF4-FFF2-40B4-BE49-F238E27FC236}">
+                  <a16:creationId xmlns:a16="http://schemas.microsoft.com/office/drawing/2014/main" id="{F399A70F-F8CD-4992-9EF5-6CF15472E73F}"/>
+                </a:ext>
+                <a:ext uri="{C183D7F6-B498-43B3-948B-1728B52AA6E4}">
+                  <adec:decorative xmlns:adec="http://schemas.microsoft.com/office/drawing/2017/decorative" val="1"/>
+                </a:ext>
+              </a:extLst>
+            </p:cNvPr>
+            <p:cNvSpPr/>
+            <p:nvPr>
+              <p:extLst>
+                <p:ext uri="{386F3935-93C4-4BCD-93E2-E3B085C9AB24}">
+                  <p16:designElem xmlns:p16="http://schemas.microsoft.com/office/powerpoint/2015/main" val="1"/>
+                </p:ext>
+              </p:extLst>
+            </p:nvPr>
+          </p:nvSpPr>
+          <p:spPr>
+            <a:xfrm>
+              <a:off x="4715626" y="308034"/>
+              <a:ext cx="566743" cy="3428999"/>
+            </a:xfrm>
+            <a:prstGeom prst="rect">
+              <a:avLst/>
+            </a:prstGeom>
+            <a:grpFill/>
+            <a:ln>
+              <a:noFill/>
+            </a:ln>
+          </p:spPr>
+          <p:style>
+            <a:lnRef idx="2">
+              <a:schemeClr val="accent1">
+                <a:shade val="50000"/>
+              </a:schemeClr>
+            </a:lnRef>
+            <a:fillRef idx="1">
+              <a:schemeClr val="accent1"/>
+            </a:fillRef>
+            <a:effectRef idx="0">
+              <a:schemeClr val="accent1"/>
+            </a:effectRef>
+            <a:fontRef idx="minor">
+              <a:schemeClr val="lt1"/>
+            </a:fontRef>
+          </p:style>
+          <p:txBody>
+            <a:bodyPr rtlCol="0" anchor="ctr"/>
+            <a:lstStyle/>
+            <a:p>
+              <a:pPr algn="ctr"/>
+              <a:endParaRPr lang="en-US"/>
+            </a:p>
+          </p:txBody>
+        </p:sp>
+        <p:sp>
+          <p:nvSpPr>
+            <p:cNvPr id="47" name="Rectangle 46">
+              <a:extLst>
+                <a:ext uri="{FF2B5EF4-FFF2-40B4-BE49-F238E27FC236}">
+                  <a16:creationId xmlns:a16="http://schemas.microsoft.com/office/drawing/2014/main" id="{48F4FEDC-6D80-458C-A665-075D9B9500FD}"/>
+                </a:ext>
+                <a:ext uri="{C183D7F6-B498-43B3-948B-1728B52AA6E4}">
+                  <adec:decorative xmlns:adec="http://schemas.microsoft.com/office/drawing/2017/decorative" val="1"/>
+                </a:ext>
+              </a:extLst>
+            </p:cNvPr>
+            <p:cNvSpPr/>
+            <p:nvPr>
+              <p:extLst>
+                <p:ext uri="{386F3935-93C4-4BCD-93E2-E3B085C9AB24}">
+                  <p16:designElem xmlns:p16="http://schemas.microsoft.com/office/powerpoint/2015/main" val="1"/>
+                </p:ext>
+              </p:extLst>
+            </p:nvPr>
+          </p:nvSpPr>
+          <p:spPr>
+            <a:xfrm>
+              <a:off x="5490650" y="308034"/>
+              <a:ext cx="566743" cy="3428999"/>
+            </a:xfrm>
+            <a:prstGeom prst="rect">
+              <a:avLst/>
+            </a:prstGeom>
+            <a:grpFill/>
+            <a:ln>
+              <a:noFill/>
+            </a:ln>
+          </p:spPr>
+          <p:style>
+            <a:lnRef idx="2">
+              <a:schemeClr val="accent1">
+                <a:shade val="50000"/>
+              </a:schemeClr>
+            </a:lnRef>
+            <a:fillRef idx="1">
+              <a:schemeClr val="accent1"/>
+            </a:fillRef>
+            <a:effectRef idx="0">
+              <a:schemeClr val="accent1"/>
+            </a:effectRef>
+            <a:fontRef idx="minor">
+              <a:schemeClr val="lt1"/>
+            </a:fontRef>
+          </p:style>
+          <p:txBody>
+            <a:bodyPr rtlCol="0" anchor="ctr"/>
+            <a:lstStyle/>
+            <a:p>
+              <a:pPr algn="ctr"/>
+              <a:endParaRPr lang="en-US"/>
+            </a:p>
+          </p:txBody>
+        </p:sp>
+      </p:grpSp>
+      <p:sp>
+        <p:nvSpPr>
+          <p:cNvPr id="49" name="Rectangle 48">
+            <a:extLst>
+              <a:ext uri="{FF2B5EF4-FFF2-40B4-BE49-F238E27FC236}">
+                <a16:creationId xmlns:a16="http://schemas.microsoft.com/office/drawing/2014/main" id="{B81933D1-5615-42C7-9C0B-4EB7105CCE2D}"/>
+              </a:ext>
+              <a:ext uri="{C183D7F6-B498-43B3-948B-1728B52AA6E4}">
+                <adec:decorative xmlns:adec="http://schemas.microsoft.com/office/drawing/2017/decorative" val="1"/>
+              </a:ext>
+            </a:extLst>
+          </p:cNvPr>
+          <p:cNvSpPr>
+            <a:spLocks noGrp="1" noRot="1" noChangeAspect="1" noMove="1" noResize="1" noEditPoints="1" noAdjustHandles="1" noChangeArrowheads="1" noChangeShapeType="1" noTextEdit="1"/>
+          </p:cNvSpPr>
+          <p:nvPr>
+            <p:extLst>
+              <p:ext uri="{386F3935-93C4-4BCD-93E2-E3B085C9AB24}">
+                <p16:designElem xmlns:p16="http://schemas.microsoft.com/office/powerpoint/2015/main" val="1"/>
+              </p:ext>
+            </p:extLst>
+          </p:nvPr>
         </p:nvSpPr>
         <p:spPr>
           <a:xfrm flipH="1">
-            <a:off x="2788244" y="0"/>
-            <a:ext cx="9403756" cy="6858000"/>
+            <a:off x="10697670" y="0"/>
+            <a:ext cx="1494330" cy="6858000"/>
           </a:xfrm>
           <a:prstGeom prst="rect">
             <a:avLst/>
           </a:prstGeom>
-          <a:gradFill>
-            <a:gsLst>
-              <a:gs pos="58000">
-                <a:schemeClr val="bg1"/>
-              </a:gs>
-              <a:gs pos="30000">
-                <a:schemeClr val="bg1">
-                  <a:alpha val="64000"/>
-                </a:schemeClr>
-              </a:gs>
-              <a:gs pos="0">
-                <a:schemeClr val="bg1">
-                  <a:alpha val="0"/>
-                </a:schemeClr>
-              </a:gs>
-              <a:gs pos="100000">
-                <a:schemeClr val="bg1"/>
-              </a:gs>
-            </a:gsLst>
-            <a:lin ang="10800000" scaled="0"/>
-          </a:gradFill>
+          <a:solidFill>
+            <a:schemeClr val="accent4"/>
+          </a:solidFill>
           <a:ln>
             <a:noFill/>
           </a:ln>
@@ -3660,53 +4233,16 @@
           <a:lstStyle/>
           <a:p>
             <a:pPr algn="ctr"/>
-            <a:endParaRPr lang="en-US" dirty="0"/>
-          </a:p>
-        </p:txBody>
-      </p:sp>
-      <p:sp>
-        <p:nvSpPr>
-          <p:cNvPr id="3" name="Subtitle 2">
-            <a:extLst>
-              <a:ext uri="{FF2B5EF4-FFF2-40B4-BE49-F238E27FC236}">
-                <a16:creationId xmlns:a16="http://schemas.microsoft.com/office/drawing/2014/main" id="{2A306314-F751-53CC-EF3D-C5DA348E5008}"/>
-              </a:ext>
-            </a:extLst>
-          </p:cNvPr>
-          <p:cNvSpPr>
-            <a:spLocks noGrp="1"/>
-          </p:cNvSpPr>
-          <p:nvPr>
-            <p:ph type="subTitle" idx="1"/>
-          </p:nvPr>
-        </p:nvSpPr>
-        <p:spPr>
-          <a:xfrm>
-            <a:off x="7848600" y="4921475"/>
-            <a:ext cx="4023360" cy="324271"/>
-          </a:xfrm>
-        </p:spPr>
-        <p:txBody>
-          <a:bodyPr>
-            <a:normAutofit fontScale="92500" lnSpcReduction="20000"/>
-          </a:bodyPr>
-          <a:lstStyle/>
-          <a:p>
-            <a:pPr algn="l"/>
-            <a:r>
-              <a:rPr lang="en-US" sz="2000"/>
-              <a:t>Odutayo Odufuwa, MCDA</a:t>
-            </a:r>
-            <a:endParaRPr lang="en-NG" sz="2000"/>
-          </a:p>
-        </p:txBody>
-      </p:sp>
-      <p:sp>
-        <p:nvSpPr>
-          <p:cNvPr id="28" name="Rectangle 27">
-            <a:extLst>
-              <a:ext uri="{FF2B5EF4-FFF2-40B4-BE49-F238E27FC236}">
-                <a16:creationId xmlns:a16="http://schemas.microsoft.com/office/drawing/2014/main" id="{AF2F604E-43BE-4DC3-B983-E071523364F8}"/>
+            <a:endParaRPr lang="en-US"/>
+          </a:p>
+        </p:txBody>
+      </p:sp>
+      <p:sp>
+        <p:nvSpPr>
+          <p:cNvPr id="51" name="Rectangle 50">
+            <a:extLst>
+              <a:ext uri="{FF2B5EF4-FFF2-40B4-BE49-F238E27FC236}">
+                <a16:creationId xmlns:a16="http://schemas.microsoft.com/office/drawing/2014/main" id="{19C9EAEA-39D0-4B0E-A0EB-51E7B26740B1}"/>
               </a:ext>
               <a:ext uri="{C183D7F6-B498-43B3-948B-1728B52AA6E4}">
                 <adec:decorative xmlns:adec="http://schemas.microsoft.com/office/drawing/2017/decorative" val="1"/>
@@ -3725,19 +4261,26 @@
           </p:nvPr>
         </p:nvSpPr>
         <p:spPr>
-          <a:xfrm rot="5400000">
-            <a:off x="8130540" y="346791"/>
-            <a:ext cx="146304" cy="704088"/>
+          <a:xfrm>
+            <a:off x="5685810" y="391886"/>
+            <a:ext cx="6009366" cy="6017078"/>
           </a:xfrm>
           <a:prstGeom prst="rect">
             <a:avLst/>
           </a:prstGeom>
           <a:solidFill>
-            <a:schemeClr val="accent2"/>
+            <a:schemeClr val="bg1"/>
           </a:solidFill>
           <a:ln>
             <a:noFill/>
           </a:ln>
+          <a:effectLst>
+            <a:outerShdw blurRad="139700" dist="127000" dir="5400000" algn="t" rotWithShape="0">
+              <a:prstClr val="black">
+                <a:alpha val="15000"/>
+              </a:prstClr>
+            </a:outerShdw>
+          </a:effectLst>
         </p:spPr>
         <p:style>
           <a:lnRef idx="2">
@@ -3760,108 +4303,45 @@
           <a:lstStyle/>
           <a:p>
             <a:pPr algn="ctr"/>
-            <a:endParaRPr lang="en-US">
-              <a:solidFill>
-                <a:prstClr val="white"/>
-              </a:solidFill>
-              <a:latin typeface="Calibri" panose="020F0502020204030204"/>
-            </a:endParaRPr>
-          </a:p>
-        </p:txBody>
-      </p:sp>
-      <p:sp>
-        <p:nvSpPr>
-          <p:cNvPr id="30" name="Rectangle 29">
-            <a:extLst>
-              <a:ext uri="{FF2B5EF4-FFF2-40B4-BE49-F238E27FC236}">
-                <a16:creationId xmlns:a16="http://schemas.microsoft.com/office/drawing/2014/main" id="{08C9B587-E65E-4B52-B37C-ABEBB6E87928}"/>
-              </a:ext>
-              <a:ext uri="{C183D7F6-B498-43B3-948B-1728B52AA6E4}">
-                <adec:decorative xmlns:adec="http://schemas.microsoft.com/office/drawing/2017/decorative" val="1"/>
-              </a:ext>
-            </a:extLst>
-          </p:cNvPr>
-          <p:cNvSpPr>
-            <a:spLocks noGrp="1" noRot="1" noChangeAspect="1" noMove="1" noResize="1" noEditPoints="1" noAdjustHandles="1" noChangeArrowheads="1" noChangeShapeType="1" noTextEdit="1"/>
-          </p:cNvSpPr>
-          <p:nvPr>
-            <p:extLst>
-              <p:ext uri="{386F3935-93C4-4BCD-93E2-E3B085C9AB24}">
-                <p16:designElem xmlns:p16="http://schemas.microsoft.com/office/powerpoint/2015/main" val="1"/>
-              </p:ext>
-            </p:extLst>
-          </p:nvPr>
-        </p:nvSpPr>
-        <p:spPr>
-          <a:xfrm>
-            <a:off x="7851648" y="4546920"/>
-            <a:ext cx="4023360" cy="18288"/>
+            <a:endParaRPr lang="en-US"/>
+          </a:p>
+        </p:txBody>
+      </p:sp>
+      <p:pic>
+        <p:nvPicPr>
+          <p:cNvPr id="5" name="Picture 4">
+            <a:extLst>
+              <a:ext uri="{FF2B5EF4-FFF2-40B4-BE49-F238E27FC236}">
+                <a16:creationId xmlns:a16="http://schemas.microsoft.com/office/drawing/2014/main" id="{9CCD81F2-76E1-9DAD-9CDA-1C100FAEFBA2}"/>
+              </a:ext>
+            </a:extLst>
+          </p:cNvPr>
+          <p:cNvPicPr>
+            <a:picLocks noChangeAspect="1"/>
+          </p:cNvPicPr>
+          <p:nvPr/>
+        </p:nvPicPr>
+        <p:blipFill rotWithShape="1">
+          <a:blip r:embed="rId2">
+            <a:extLst>
+              <a:ext uri="{28A0092B-C50C-407E-A947-70E740481C1C}">
+                <a14:useLocalDpi xmlns:a14="http://schemas.microsoft.com/office/drawing/2010/main" val="0"/>
+              </a:ext>
+            </a:extLst>
+          </a:blip>
+          <a:srcRect l="9091" t="18558" r="-2" b="9339"/>
+          <a:stretch/>
+        </p:blipFill>
+        <p:spPr>
+          <a:xfrm>
+            <a:off x="5922492" y="1209766"/>
+            <a:ext cx="5536001" cy="4379715"/>
           </a:xfrm>
           <a:prstGeom prst="rect">
             <a:avLst/>
           </a:prstGeom>
-          <a:solidFill>
-            <a:schemeClr val="tx1"/>
-          </a:solidFill>
-          <a:ln w="3175">
-            <a:noFill/>
-          </a:ln>
-          <a:effectLst/>
-        </p:spPr>
-        <p:style>
-          <a:lnRef idx="2">
-            <a:schemeClr val="accent1">
-              <a:shade val="50000"/>
-            </a:schemeClr>
-          </a:lnRef>
-          <a:fillRef idx="1">
-            <a:schemeClr val="accent1"/>
-          </a:fillRef>
-          <a:effectRef idx="0">
-            <a:schemeClr val="accent1"/>
-          </a:effectRef>
-          <a:fontRef idx="minor">
-            <a:schemeClr val="lt1"/>
-          </a:fontRef>
-        </p:style>
-        <p:txBody>
-          <a:bodyPr rtlCol="0" anchor="ctr"/>
-          <a:lstStyle/>
-          <a:p>
-            <a:pPr marL="0" marR="0" lvl="0" indent="0" algn="ctr" defTabSz="914400" rtl="0" eaLnBrk="1" fontAlgn="auto" latinLnBrk="0" hangingPunct="1">
-              <a:lnSpc>
-                <a:spcPct val="100000"/>
-              </a:lnSpc>
-              <a:spcBef>
-                <a:spcPts val="0"/>
-              </a:spcBef>
-              <a:spcAft>
-                <a:spcPts val="0"/>
-              </a:spcAft>
-              <a:buClrTx/>
-              <a:buSzTx/>
-              <a:buFontTx/>
-              <a:buNone/>
-              <a:tabLst/>
-              <a:defRPr/>
-            </a:pPr>
-            <a:endParaRPr kumimoji="0" lang="en-US" sz="1800" b="0" i="0" u="none" strike="noStrike" kern="1200" cap="none" spc="0" normalizeH="0" baseline="0" noProof="0">
-              <a:ln>
-                <a:noFill/>
-              </a:ln>
-              <a:solidFill>
-                <a:prstClr val="white"/>
-              </a:solidFill>
-              <a:effectLst/>
-              <a:uLnTx/>
-              <a:uFillTx/>
-              <a:latin typeface="Calibri" panose="020F0502020204030204"/>
-              <a:ea typeface="+mn-ea"/>
-              <a:cs typeface="+mn-cs"/>
-            </a:endParaRPr>
-          </a:p>
-        </p:txBody>
-      </p:sp>
+        </p:spPr>
+      </p:pic>
       <p:sp>
         <p:nvSpPr>
           <p:cNvPr id="4" name="Subtitle 2">
@@ -4089,7 +4569,7 @@
     </p:extLst>
   </p:cSld>
   <p:clrMapOvr>
-    <a:overrideClrMapping bg1="dk1" tx1="lt1" bg2="dk2" tx2="lt2" accent1="accent1" accent2="accent2" accent3="accent3" accent4="accent4" accent5="accent5" accent6="accent6" hlink="hlink" folHlink="folHlink"/>
+    <a:masterClrMapping/>
   </p:clrMapOvr>
 </p:sld>
 </file>
@@ -5894,10 +6374,10 @@
       </p:grpSpPr>
       <p:sp useBgFill="1">
         <p:nvSpPr>
-          <p:cNvPr id="8" name="Rectangle 7">
-            <a:extLst>
-              <a:ext uri="{FF2B5EF4-FFF2-40B4-BE49-F238E27FC236}">
-                <a16:creationId xmlns:a16="http://schemas.microsoft.com/office/drawing/2014/main" id="{0671A8AE-40A1-4631-A6B8-581AFF065482}"/>
+          <p:cNvPr id="19" name="Rectangle 18">
+            <a:extLst>
+              <a:ext uri="{FF2B5EF4-FFF2-40B4-BE49-F238E27FC236}">
+                <a16:creationId xmlns:a16="http://schemas.microsoft.com/office/drawing/2014/main" id="{47942995-B07F-4636-9A06-C6A104B260A8}"/>
               </a:ext>
               <a:ext uri="{C183D7F6-B498-43B3-948B-1728B52AA6E4}">
                 <adec:decorative xmlns:adec="http://schemas.microsoft.com/office/drawing/2017/decorative" val="1"/>
@@ -5918,7 +6398,7 @@
         <p:spPr>
           <a:xfrm>
             <a:off x="0" y="0"/>
-            <a:ext cx="12192000" cy="6858000"/>
+            <a:ext cx="12191999" cy="6857365"/>
           </a:xfrm>
           <a:prstGeom prst="rect">
             <a:avLst/>
@@ -5952,50 +6432,63 @@
           </a:p>
         </p:txBody>
       </p:sp>
-      <p:pic>
-        <p:nvPicPr>
-          <p:cNvPr id="4" name="Picture 3" descr="Bright modern kitchen">
-            <a:extLst>
-              <a:ext uri="{FF2B5EF4-FFF2-40B4-BE49-F238E27FC236}">
-                <a16:creationId xmlns:a16="http://schemas.microsoft.com/office/drawing/2014/main" id="{0A1FA50B-6EF5-90B6-8A07-65958175C533}"/>
-              </a:ext>
-            </a:extLst>
-          </p:cNvPr>
-          <p:cNvPicPr>
-            <a:picLocks noChangeAspect="1"/>
-          </p:cNvPicPr>
-          <p:nvPr/>
-        </p:nvPicPr>
-        <p:blipFill rotWithShape="1">
-          <a:blip r:embed="rId2"/>
-          <a:srcRect l="3163" r="12464" b="-1"/>
-          <a:stretch/>
-        </p:blipFill>
-        <p:spPr>
-          <a:xfrm>
-            <a:off x="3523488" y="10"/>
-            <a:ext cx="8668512" cy="6857990"/>
-          </a:xfrm>
-          <a:prstGeom prst="rect">
-            <a:avLst/>
-          </a:prstGeom>
-        </p:spPr>
-      </p:pic>
-      <p:sp>
-        <p:nvSpPr>
-          <p:cNvPr id="10" name="Rectangle 9">
-            <a:extLst>
-              <a:ext uri="{FF2B5EF4-FFF2-40B4-BE49-F238E27FC236}">
-                <a16:creationId xmlns:a16="http://schemas.microsoft.com/office/drawing/2014/main" id="{AB58EF07-17C2-48CF-ABB0-EEF1F17CB8F0}"/>
+      <p:sp>
+        <p:nvSpPr>
+          <p:cNvPr id="2" name="Title 1">
+            <a:extLst>
+              <a:ext uri="{FF2B5EF4-FFF2-40B4-BE49-F238E27FC236}">
+                <a16:creationId xmlns:a16="http://schemas.microsoft.com/office/drawing/2014/main" id="{7B71D3B0-BE5B-FC78-6E86-FC9E6281B0F9}"/>
+              </a:ext>
+            </a:extLst>
+          </p:cNvPr>
+          <p:cNvSpPr>
+            <a:spLocks noGrp="1"/>
+          </p:cNvSpPr>
+          <p:nvPr>
+            <p:ph type="title"/>
+          </p:nvPr>
+        </p:nvSpPr>
+        <p:spPr>
+          <a:xfrm>
+            <a:off x="1113810" y="2960716"/>
+            <a:ext cx="4036334" cy="2387600"/>
+          </a:xfrm>
+        </p:spPr>
+        <p:txBody>
+          <a:bodyPr vert="horz" lIns="91440" tIns="45720" rIns="91440" bIns="45720" rtlCol="0" anchor="t">
+            <a:normAutofit/>
+          </a:bodyPr>
+          <a:lstStyle/>
+          <a:p>
+            <a:r>
+              <a:rPr lang="en-US" sz="5400" kern="1200">
+                <a:solidFill>
+                  <a:schemeClr val="tx1"/>
+                </a:solidFill>
+                <a:latin typeface="+mj-lt"/>
+                <a:ea typeface="+mj-ea"/>
+                <a:cs typeface="+mj-cs"/>
+              </a:rPr>
+              <a:t>Thank You</a:t>
+            </a:r>
+          </a:p>
+        </p:txBody>
+      </p:sp>
+      <p:grpSp>
+        <p:nvGrpSpPr>
+          <p:cNvPr id="21" name="Group 20">
+            <a:extLst>
+              <a:ext uri="{FF2B5EF4-FFF2-40B4-BE49-F238E27FC236}">
+                <a16:creationId xmlns:a16="http://schemas.microsoft.com/office/drawing/2014/main" id="{032D8612-31EB-44CF-A1D0-14FD4C705424}"/>
               </a:ext>
               <a:ext uri="{C183D7F6-B498-43B3-948B-1728B52AA6E4}">
                 <adec:decorative xmlns:adec="http://schemas.microsoft.com/office/drawing/2017/decorative" val="1"/>
               </a:ext>
             </a:extLst>
           </p:cNvPr>
-          <p:cNvSpPr>
-            <a:spLocks noGrp="1" noRot="1" noChangeAspect="1" noMove="1" noResize="1" noEditPoints="1" noAdjustHandles="1" noChangeArrowheads="1" noChangeShapeType="1" noTextEdit="1"/>
-          </p:cNvSpPr>
+          <p:cNvGrpSpPr>
+            <a:grpSpLocks noGrp="1" noUngrp="1" noRot="1" noChangeAspect="1" noMove="1" noResize="1"/>
+          </p:cNvGrpSpPr>
           <p:nvPr>
             <p:extLst>
               <p:ext uri="{386F3935-93C4-4BCD-93E2-E3B085C9AB24}">
@@ -6003,36 +6496,230 @@
               </p:ext>
             </p:extLst>
           </p:nvPr>
-        </p:nvSpPr>
-        <p:spPr>
-          <a:xfrm>
-            <a:off x="3" y="0"/>
-            <a:ext cx="9339206" cy="6858000"/>
+        </p:nvGrpSpPr>
+        <p:grpSpPr>
+          <a:xfrm>
+            <a:off x="0" y="2984992"/>
+            <a:ext cx="731521" cy="673460"/>
+            <a:chOff x="3940602" y="308034"/>
+            <a:chExt cx="2116791" cy="3428999"/>
+          </a:xfrm>
+          <a:solidFill>
+            <a:schemeClr val="accent4"/>
+          </a:solidFill>
+        </p:grpSpPr>
+        <p:sp>
+          <p:nvSpPr>
+            <p:cNvPr id="22" name="Rectangle 21">
+              <a:extLst>
+                <a:ext uri="{FF2B5EF4-FFF2-40B4-BE49-F238E27FC236}">
+                  <a16:creationId xmlns:a16="http://schemas.microsoft.com/office/drawing/2014/main" id="{F19A4A0F-1B59-4DB0-9764-D10936E98770}"/>
+                </a:ext>
+                <a:ext uri="{C183D7F6-B498-43B3-948B-1728B52AA6E4}">
+                  <adec:decorative xmlns:adec="http://schemas.microsoft.com/office/drawing/2017/decorative" val="1"/>
+                </a:ext>
+              </a:extLst>
+            </p:cNvPr>
+            <p:cNvSpPr/>
+            <p:nvPr>
+              <p:extLst>
+                <p:ext uri="{386F3935-93C4-4BCD-93E2-E3B085C9AB24}">
+                  <p16:designElem xmlns:p16="http://schemas.microsoft.com/office/powerpoint/2015/main" val="1"/>
+                </p:ext>
+              </p:extLst>
+            </p:nvPr>
+          </p:nvSpPr>
+          <p:spPr>
+            <a:xfrm>
+              <a:off x="3940602" y="308034"/>
+              <a:ext cx="566743" cy="3428999"/>
+            </a:xfrm>
+            <a:prstGeom prst="rect">
+              <a:avLst/>
+            </a:prstGeom>
+            <a:grpFill/>
+            <a:ln>
+              <a:noFill/>
+            </a:ln>
+          </p:spPr>
+          <p:style>
+            <a:lnRef idx="2">
+              <a:schemeClr val="accent1">
+                <a:shade val="50000"/>
+              </a:schemeClr>
+            </a:lnRef>
+            <a:fillRef idx="1">
+              <a:schemeClr val="accent1"/>
+            </a:fillRef>
+            <a:effectRef idx="0">
+              <a:schemeClr val="accent1"/>
+            </a:effectRef>
+            <a:fontRef idx="minor">
+              <a:schemeClr val="lt1"/>
+            </a:fontRef>
+          </p:style>
+          <p:txBody>
+            <a:bodyPr rtlCol="0" anchor="ctr"/>
+            <a:lstStyle/>
+            <a:p>
+              <a:pPr algn="ctr"/>
+              <a:endParaRPr lang="en-US"/>
+            </a:p>
+          </p:txBody>
+        </p:sp>
+        <p:sp>
+          <p:nvSpPr>
+            <p:cNvPr id="23" name="Rectangle 22">
+              <a:extLst>
+                <a:ext uri="{FF2B5EF4-FFF2-40B4-BE49-F238E27FC236}">
+                  <a16:creationId xmlns:a16="http://schemas.microsoft.com/office/drawing/2014/main" id="{F399A70F-F8CD-4992-9EF5-6CF15472E73F}"/>
+                </a:ext>
+                <a:ext uri="{C183D7F6-B498-43B3-948B-1728B52AA6E4}">
+                  <adec:decorative xmlns:adec="http://schemas.microsoft.com/office/drawing/2017/decorative" val="1"/>
+                </a:ext>
+              </a:extLst>
+            </p:cNvPr>
+            <p:cNvSpPr/>
+            <p:nvPr>
+              <p:extLst>
+                <p:ext uri="{386F3935-93C4-4BCD-93E2-E3B085C9AB24}">
+                  <p16:designElem xmlns:p16="http://schemas.microsoft.com/office/powerpoint/2015/main" val="1"/>
+                </p:ext>
+              </p:extLst>
+            </p:nvPr>
+          </p:nvSpPr>
+          <p:spPr>
+            <a:xfrm>
+              <a:off x="4715626" y="308034"/>
+              <a:ext cx="566743" cy="3428999"/>
+            </a:xfrm>
+            <a:prstGeom prst="rect">
+              <a:avLst/>
+            </a:prstGeom>
+            <a:grpFill/>
+            <a:ln>
+              <a:noFill/>
+            </a:ln>
+          </p:spPr>
+          <p:style>
+            <a:lnRef idx="2">
+              <a:schemeClr val="accent1">
+                <a:shade val="50000"/>
+              </a:schemeClr>
+            </a:lnRef>
+            <a:fillRef idx="1">
+              <a:schemeClr val="accent1"/>
+            </a:fillRef>
+            <a:effectRef idx="0">
+              <a:schemeClr val="accent1"/>
+            </a:effectRef>
+            <a:fontRef idx="minor">
+              <a:schemeClr val="lt1"/>
+            </a:fontRef>
+          </p:style>
+          <p:txBody>
+            <a:bodyPr rtlCol="0" anchor="ctr"/>
+            <a:lstStyle/>
+            <a:p>
+              <a:pPr algn="ctr"/>
+              <a:endParaRPr lang="en-US"/>
+            </a:p>
+          </p:txBody>
+        </p:sp>
+        <p:sp>
+          <p:nvSpPr>
+            <p:cNvPr id="24" name="Rectangle 23">
+              <a:extLst>
+                <a:ext uri="{FF2B5EF4-FFF2-40B4-BE49-F238E27FC236}">
+                  <a16:creationId xmlns:a16="http://schemas.microsoft.com/office/drawing/2014/main" id="{48F4FEDC-6D80-458C-A665-075D9B9500FD}"/>
+                </a:ext>
+                <a:ext uri="{C183D7F6-B498-43B3-948B-1728B52AA6E4}">
+                  <adec:decorative xmlns:adec="http://schemas.microsoft.com/office/drawing/2017/decorative" val="1"/>
+                </a:ext>
+              </a:extLst>
+            </p:cNvPr>
+            <p:cNvSpPr/>
+            <p:nvPr>
+              <p:extLst>
+                <p:ext uri="{386F3935-93C4-4BCD-93E2-E3B085C9AB24}">
+                  <p16:designElem xmlns:p16="http://schemas.microsoft.com/office/powerpoint/2015/main" val="1"/>
+                </p:ext>
+              </p:extLst>
+            </p:nvPr>
+          </p:nvSpPr>
+          <p:spPr>
+            <a:xfrm>
+              <a:off x="5490650" y="308034"/>
+              <a:ext cx="566743" cy="3428999"/>
+            </a:xfrm>
+            <a:prstGeom prst="rect">
+              <a:avLst/>
+            </a:prstGeom>
+            <a:grpFill/>
+            <a:ln>
+              <a:noFill/>
+            </a:ln>
+          </p:spPr>
+          <p:style>
+            <a:lnRef idx="2">
+              <a:schemeClr val="accent1">
+                <a:shade val="50000"/>
+              </a:schemeClr>
+            </a:lnRef>
+            <a:fillRef idx="1">
+              <a:schemeClr val="accent1"/>
+            </a:fillRef>
+            <a:effectRef idx="0">
+              <a:schemeClr val="accent1"/>
+            </a:effectRef>
+            <a:fontRef idx="minor">
+              <a:schemeClr val="lt1"/>
+            </a:fontRef>
+          </p:style>
+          <p:txBody>
+            <a:bodyPr rtlCol="0" anchor="ctr"/>
+            <a:lstStyle/>
+            <a:p>
+              <a:pPr algn="ctr"/>
+              <a:endParaRPr lang="en-US"/>
+            </a:p>
+          </p:txBody>
+        </p:sp>
+      </p:grpSp>
+      <p:sp>
+        <p:nvSpPr>
+          <p:cNvPr id="26" name="Rectangle 25">
+            <a:extLst>
+              <a:ext uri="{FF2B5EF4-FFF2-40B4-BE49-F238E27FC236}">
+                <a16:creationId xmlns:a16="http://schemas.microsoft.com/office/drawing/2014/main" id="{B81933D1-5615-42C7-9C0B-4EB7105CCE2D}"/>
+              </a:ext>
+              <a:ext uri="{C183D7F6-B498-43B3-948B-1728B52AA6E4}">
+                <adec:decorative xmlns:adec="http://schemas.microsoft.com/office/drawing/2017/decorative" val="1"/>
+              </a:ext>
+            </a:extLst>
+          </p:cNvPr>
+          <p:cNvSpPr>
+            <a:spLocks noGrp="1" noRot="1" noChangeAspect="1" noMove="1" noResize="1" noEditPoints="1" noAdjustHandles="1" noChangeArrowheads="1" noChangeShapeType="1" noTextEdit="1"/>
+          </p:cNvSpPr>
+          <p:nvPr>
+            <p:extLst>
+              <p:ext uri="{386F3935-93C4-4BCD-93E2-E3B085C9AB24}">
+                <p16:designElem xmlns:p16="http://schemas.microsoft.com/office/powerpoint/2015/main" val="1"/>
+              </p:ext>
+            </p:extLst>
+          </p:nvPr>
+        </p:nvSpPr>
+        <p:spPr>
+          <a:xfrm flipH="1">
+            <a:off x="10697670" y="0"/>
+            <a:ext cx="1494330" cy="6858000"/>
           </a:xfrm>
           <a:prstGeom prst="rect">
             <a:avLst/>
           </a:prstGeom>
-          <a:gradFill>
-            <a:gsLst>
-              <a:gs pos="58000">
-                <a:schemeClr val="bg1"/>
-              </a:gs>
-              <a:gs pos="33000">
-                <a:schemeClr val="bg1">
-                  <a:alpha val="64000"/>
-                </a:schemeClr>
-              </a:gs>
-              <a:gs pos="0">
-                <a:schemeClr val="bg1">
-                  <a:alpha val="0"/>
-                </a:schemeClr>
-              </a:gs>
-              <a:gs pos="100000">
-                <a:schemeClr val="bg1"/>
-              </a:gs>
-            </a:gsLst>
-            <a:lin ang="10800000" scaled="0"/>
-          </a:gradFill>
+          <a:solidFill>
+            <a:schemeClr val="accent4"/>
+          </a:solidFill>
           <a:ln>
             <a:noFill/>
           </a:ln>
@@ -6058,51 +6745,16 @@
           <a:lstStyle/>
           <a:p>
             <a:pPr algn="ctr"/>
-            <a:endParaRPr lang="en-US" dirty="0"/>
-          </a:p>
-        </p:txBody>
-      </p:sp>
-      <p:sp>
-        <p:nvSpPr>
-          <p:cNvPr id="2" name="Title 1">
-            <a:extLst>
-              <a:ext uri="{FF2B5EF4-FFF2-40B4-BE49-F238E27FC236}">
-                <a16:creationId xmlns:a16="http://schemas.microsoft.com/office/drawing/2014/main" id="{7B71D3B0-BE5B-FC78-6E86-FC9E6281B0F9}"/>
-              </a:ext>
-            </a:extLst>
-          </p:cNvPr>
-          <p:cNvSpPr>
-            <a:spLocks noGrp="1"/>
-          </p:cNvSpPr>
-          <p:nvPr>
-            <p:ph type="title"/>
-          </p:nvPr>
-        </p:nvSpPr>
-        <p:spPr>
-          <a:xfrm>
-            <a:off x="477981" y="1122363"/>
-            <a:ext cx="4023360" cy="3204134"/>
-          </a:xfrm>
-        </p:spPr>
-        <p:txBody>
-          <a:bodyPr vert="horz" lIns="91440" tIns="45720" rIns="91440" bIns="45720" rtlCol="0" anchor="b">
-            <a:normAutofit/>
-          </a:bodyPr>
-          <a:lstStyle/>
-          <a:p>
-            <a:r>
-              <a:rPr lang="en-US" sz="4800"/>
-              <a:t>Thank You</a:t>
-            </a:r>
-          </a:p>
-        </p:txBody>
-      </p:sp>
-      <p:sp>
-        <p:nvSpPr>
-          <p:cNvPr id="12" name="Rectangle 11">
-            <a:extLst>
-              <a:ext uri="{FF2B5EF4-FFF2-40B4-BE49-F238E27FC236}">
-                <a16:creationId xmlns:a16="http://schemas.microsoft.com/office/drawing/2014/main" id="{AF2F604E-43BE-4DC3-B983-E071523364F8}"/>
+            <a:endParaRPr lang="en-US"/>
+          </a:p>
+        </p:txBody>
+      </p:sp>
+      <p:sp>
+        <p:nvSpPr>
+          <p:cNvPr id="28" name="Rectangle 27">
+            <a:extLst>
+              <a:ext uri="{FF2B5EF4-FFF2-40B4-BE49-F238E27FC236}">
+                <a16:creationId xmlns:a16="http://schemas.microsoft.com/office/drawing/2014/main" id="{19C9EAEA-39D0-4B0E-A0EB-51E7B26740B1}"/>
               </a:ext>
               <a:ext uri="{C183D7F6-B498-43B3-948B-1728B52AA6E4}">
                 <adec:decorative xmlns:adec="http://schemas.microsoft.com/office/drawing/2017/decorative" val="1"/>
@@ -6121,19 +6773,26 @@
           </p:nvPr>
         </p:nvSpPr>
         <p:spPr>
-          <a:xfrm rot="5400000">
-            <a:off x="759921" y="346791"/>
-            <a:ext cx="146304" cy="704088"/>
+          <a:xfrm>
+            <a:off x="5685810" y="391886"/>
+            <a:ext cx="6009366" cy="6017078"/>
           </a:xfrm>
           <a:prstGeom prst="rect">
             <a:avLst/>
           </a:prstGeom>
           <a:solidFill>
-            <a:schemeClr val="accent2"/>
+            <a:schemeClr val="bg1"/>
           </a:solidFill>
           <a:ln>
             <a:noFill/>
           </a:ln>
+          <a:effectLst>
+            <a:outerShdw blurRad="139700" dist="127000" dir="5400000" algn="t" rotWithShape="0">
+              <a:prstClr val="black">
+                <a:alpha val="15000"/>
+              </a:prstClr>
+            </a:outerShdw>
+          </a:effectLst>
         </p:spPr>
         <p:style>
           <a:lnRef idx="2">
@@ -6156,108 +6815,39 @@
           <a:lstStyle/>
           <a:p>
             <a:pPr algn="ctr"/>
-            <a:endParaRPr lang="en-US">
-              <a:solidFill>
-                <a:prstClr val="white"/>
-              </a:solidFill>
-              <a:latin typeface="Calibri" panose="020F0502020204030204"/>
-            </a:endParaRPr>
-          </a:p>
-        </p:txBody>
-      </p:sp>
-      <p:sp>
-        <p:nvSpPr>
-          <p:cNvPr id="14" name="Rectangle 13">
-            <a:extLst>
-              <a:ext uri="{FF2B5EF4-FFF2-40B4-BE49-F238E27FC236}">
-                <a16:creationId xmlns:a16="http://schemas.microsoft.com/office/drawing/2014/main" id="{08C9B587-E65E-4B52-B37C-ABEBB6E87928}"/>
-              </a:ext>
-              <a:ext uri="{C183D7F6-B498-43B3-948B-1728B52AA6E4}">
-                <adec:decorative xmlns:adec="http://schemas.microsoft.com/office/drawing/2017/decorative" val="1"/>
-              </a:ext>
-            </a:extLst>
-          </p:cNvPr>
-          <p:cNvSpPr>
-            <a:spLocks noGrp="1" noRot="1" noChangeAspect="1" noMove="1" noResize="1" noEditPoints="1" noAdjustHandles="1" noChangeArrowheads="1" noChangeShapeType="1" noTextEdit="1"/>
-          </p:cNvSpPr>
-          <p:nvPr>
-            <p:extLst>
-              <p:ext uri="{386F3935-93C4-4BCD-93E2-E3B085C9AB24}">
-                <p16:designElem xmlns:p16="http://schemas.microsoft.com/office/powerpoint/2015/main" val="1"/>
-              </p:ext>
-            </p:extLst>
-          </p:nvPr>
-        </p:nvSpPr>
-        <p:spPr>
-          <a:xfrm>
-            <a:off x="481029" y="4546920"/>
-            <a:ext cx="3977640" cy="18288"/>
+            <a:endParaRPr lang="en-US"/>
+          </a:p>
+        </p:txBody>
+      </p:sp>
+      <p:pic>
+        <p:nvPicPr>
+          <p:cNvPr id="4" name="Picture 3" descr="Bright modern kitchen">
+            <a:extLst>
+              <a:ext uri="{FF2B5EF4-FFF2-40B4-BE49-F238E27FC236}">
+                <a16:creationId xmlns:a16="http://schemas.microsoft.com/office/drawing/2014/main" id="{0A1FA50B-6EF5-90B6-8A07-65958175C533}"/>
+              </a:ext>
+            </a:extLst>
+          </p:cNvPr>
+          <p:cNvPicPr>
+            <a:picLocks noChangeAspect="1"/>
+          </p:cNvPicPr>
+          <p:nvPr/>
+        </p:nvPicPr>
+        <p:blipFill rotWithShape="1">
+          <a:blip r:embed="rId2"/>
+          <a:srcRect l="3163" r="12464" b="-1"/>
+          <a:stretch/>
+        </p:blipFill>
+        <p:spPr>
+          <a:xfrm>
+            <a:off x="5922492" y="1209754"/>
+            <a:ext cx="5536001" cy="4379739"/>
           </a:xfrm>
           <a:prstGeom prst="rect">
             <a:avLst/>
           </a:prstGeom>
-          <a:solidFill>
-            <a:schemeClr val="tx1"/>
-          </a:solidFill>
-          <a:ln w="3175">
-            <a:noFill/>
-          </a:ln>
-          <a:effectLst/>
-        </p:spPr>
-        <p:style>
-          <a:lnRef idx="2">
-            <a:schemeClr val="accent1">
-              <a:shade val="50000"/>
-            </a:schemeClr>
-          </a:lnRef>
-          <a:fillRef idx="1">
-            <a:schemeClr val="accent1"/>
-          </a:fillRef>
-          <a:effectRef idx="0">
-            <a:schemeClr val="accent1"/>
-          </a:effectRef>
-          <a:fontRef idx="minor">
-            <a:schemeClr val="lt1"/>
-          </a:fontRef>
-        </p:style>
-        <p:txBody>
-          <a:bodyPr rtlCol="0" anchor="ctr"/>
-          <a:lstStyle/>
-          <a:p>
-            <a:pPr marL="0" marR="0" lvl="0" indent="0" algn="ctr" defTabSz="914400" rtl="0" eaLnBrk="1" fontAlgn="auto" latinLnBrk="0" hangingPunct="1">
-              <a:lnSpc>
-                <a:spcPct val="100000"/>
-              </a:lnSpc>
-              <a:spcBef>
-                <a:spcPts val="0"/>
-              </a:spcBef>
-              <a:spcAft>
-                <a:spcPts val="0"/>
-              </a:spcAft>
-              <a:buClrTx/>
-              <a:buSzTx/>
-              <a:buFontTx/>
-              <a:buNone/>
-              <a:tabLst/>
-              <a:defRPr/>
-            </a:pPr>
-            <a:endParaRPr kumimoji="0" lang="en-US" sz="1800" b="0" i="0" u="none" strike="noStrike" kern="1200" cap="none" spc="0" normalizeH="0" baseline="0" noProof="0">
-              <a:ln>
-                <a:noFill/>
-              </a:ln>
-              <a:solidFill>
-                <a:prstClr val="white"/>
-              </a:solidFill>
-              <a:effectLst/>
-              <a:uLnTx/>
-              <a:uFillTx/>
-              <a:latin typeface="Calibri" panose="020F0502020204030204"/>
-              <a:ea typeface="+mn-ea"/>
-              <a:cs typeface="+mn-cs"/>
-            </a:endParaRPr>
-          </a:p>
-        </p:txBody>
-      </p:sp>
+        </p:spPr>
+      </p:pic>
     </p:spTree>
     <p:extLst>
       <p:ext uri="{BB962C8B-B14F-4D97-AF65-F5344CB8AC3E}">
@@ -6266,7 +6856,7 @@
     </p:extLst>
   </p:cSld>
   <p:clrMapOvr>
-    <a:overrideClrMapping bg1="dk1" tx1="lt1" bg2="dk2" tx2="lt2" accent1="accent1" accent2="accent2" accent3="accent3" accent4="accent4" accent5="accent5" accent6="accent6" hlink="hlink" folHlink="folHlink"/>
+    <a:masterClrMapping/>
   </p:clrMapOvr>
 </p:sld>
 </file>
@@ -6296,12 +6886,12 @@
           <a:chExt cx="0" cy="0"/>
         </a:xfrm>
       </p:grpSpPr>
-      <p:sp>
-        <p:nvSpPr>
-          <p:cNvPr id="19" name="Rectangle 18">
-            <a:extLst>
-              <a:ext uri="{FF2B5EF4-FFF2-40B4-BE49-F238E27FC236}">
-                <a16:creationId xmlns:a16="http://schemas.microsoft.com/office/drawing/2014/main" id="{823AC064-BC96-4F32-8AE1-B2FD38754823}"/>
+      <p:sp useBgFill="1">
+        <p:nvSpPr>
+          <p:cNvPr id="25" name="Rectangle 27">
+            <a:extLst>
+              <a:ext uri="{FF2B5EF4-FFF2-40B4-BE49-F238E27FC236}">
+                <a16:creationId xmlns:a16="http://schemas.microsoft.com/office/drawing/2014/main" id="{71EC1228-8B00-4D31-8616-AAB846D68CEF}"/>
               </a:ext>
               <a:ext uri="{C183D7F6-B498-43B3-948B-1728B52AA6E4}">
                 <adec:decorative xmlns:adec="http://schemas.microsoft.com/office/drawing/2017/decorative" val="1"/>
@@ -6319,21 +6909,16 @@
             </p:extLst>
           </p:nvPr>
         </p:nvSpPr>
-        <p:spPr bwMode="ltGray">
-          <a:xfrm>
-            <a:off x="396882" y="280374"/>
-            <a:ext cx="11438793" cy="1844256"/>
+        <p:spPr>
+          <a:xfrm>
+            <a:off x="0" y="0"/>
+            <a:ext cx="12191999" cy="6857365"/>
           </a:xfrm>
           <a:prstGeom prst="rect">
             <a:avLst/>
           </a:prstGeom>
-          <a:solidFill>
-            <a:srgbClr val="404040"/>
-          </a:solidFill>
-          <a:ln w="127000" cap="sq" cmpd="thinThick">
-            <a:solidFill>
-              <a:srgbClr val="404040"/>
-            </a:solidFill>
+          <a:ln>
+            <a:noFill/>
           </a:ln>
         </p:spPr>
         <p:style>
@@ -6379,47 +6964,40 @@
         </p:nvSpPr>
         <p:spPr>
           <a:xfrm>
-            <a:off x="546351" y="433545"/>
-            <a:ext cx="11139854" cy="930447"/>
-          </a:xfrm>
-        </p:spPr>
-        <p:txBody>
-          <a:bodyPr>
+            <a:off x="9267909" y="2023110"/>
+            <a:ext cx="2469624" cy="2846070"/>
+          </a:xfrm>
+        </p:spPr>
+        <p:txBody>
+          <a:bodyPr anchor="ctr">
             <a:normAutofit/>
           </a:bodyPr>
           <a:lstStyle/>
           <a:p>
-            <a:r>
-              <a:rPr lang="en-US" sz="5400" u="sng">
-                <a:solidFill>
-                  <a:srgbClr val="FFFFFF"/>
-                </a:solidFill>
-              </a:rPr>
+            <a:pPr algn="l"/>
+            <a:r>
+              <a:rPr lang="en-US" sz="3700" u="sng"/>
               <a:t>TABLES</a:t>
             </a:r>
-            <a:endParaRPr lang="en-NG" sz="5400" u="sng">
-              <a:solidFill>
-                <a:srgbClr val="FFFFFF"/>
-              </a:solidFill>
-            </a:endParaRPr>
-          </a:p>
-        </p:txBody>
-      </p:sp>
-      <p:cxnSp>
-        <p:nvCxnSpPr>
-          <p:cNvPr id="21" name="Straight Connector 20">
-            <a:extLst>
-              <a:ext uri="{FF2B5EF4-FFF2-40B4-BE49-F238E27FC236}">
-                <a16:creationId xmlns:a16="http://schemas.microsoft.com/office/drawing/2014/main" id="{7E7C77BC-7138-40B1-A15B-20F57A494629}"/>
+            <a:endParaRPr lang="en-NG" sz="3700" u="sng"/>
+          </a:p>
+        </p:txBody>
+      </p:sp>
+      <p:sp>
+        <p:nvSpPr>
+          <p:cNvPr id="26" name="Rectangle 29">
+            <a:extLst>
+              <a:ext uri="{FF2B5EF4-FFF2-40B4-BE49-F238E27FC236}">
+                <a16:creationId xmlns:a16="http://schemas.microsoft.com/office/drawing/2014/main" id="{99413ED5-9ED4-4772-BCE4-2BCAE6B12E35}"/>
               </a:ext>
               <a:ext uri="{C183D7F6-B498-43B3-948B-1728B52AA6E4}">
                 <adec:decorative xmlns:adec="http://schemas.microsoft.com/office/drawing/2017/decorative" val="1"/>
               </a:ext>
             </a:extLst>
           </p:cNvPr>
-          <p:cNvCxnSpPr>
-            <a:cxnSpLocks noGrp="1" noRot="1" noChangeAspect="1" noMove="1" noResize="1" noEditPoints="1" noAdjustHandles="1" noChangeArrowheads="1" noChangeShapeType="1"/>
-          </p:cNvCxnSpPr>
+          <p:cNvSpPr>
+            <a:spLocks noGrp="1" noRot="1" noChangeAspect="1" noMove="1" noResize="1" noEditPoints="1" noAdjustHandles="1" noChangeArrowheads="1" noChangeShapeType="1" noTextEdit="1"/>
+          </p:cNvSpPr>
           <p:nvPr>
             <p:extLst>
               <p:ext uri="{386F3935-93C4-4BCD-93E2-E3B085C9AB24}">
@@ -6427,36 +7005,117 @@
               </p:ext>
             </p:extLst>
           </p:nvPr>
-        </p:nvCxnSpPr>
-        <p:spPr>
-          <a:xfrm>
-            <a:off x="2230078" y="1522292"/>
-            <a:ext cx="7772400" cy="0"/>
-          </a:xfrm>
-          <a:prstGeom prst="line">
+        </p:nvSpPr>
+        <p:spPr>
+          <a:xfrm rot="16200000">
+            <a:off x="3433973" y="-827233"/>
+            <a:ext cx="1715478" cy="8583421"/>
+          </a:xfrm>
+          <a:prstGeom prst="rect">
             <a:avLst/>
           </a:prstGeom>
-          <a:ln w="22225">
-            <a:solidFill>
-              <a:srgbClr val="D9D9D9"/>
-            </a:solidFill>
+          <a:solidFill>
+            <a:schemeClr val="accent4"/>
+          </a:solidFill>
+          <a:ln>
+            <a:noFill/>
           </a:ln>
         </p:spPr>
         <p:style>
-          <a:lnRef idx="1">
-            <a:schemeClr val="accent1"/>
+          <a:lnRef idx="2">
+            <a:schemeClr val="accent1">
+              <a:shade val="50000"/>
+            </a:schemeClr>
           </a:lnRef>
-          <a:fillRef idx="0">
+          <a:fillRef idx="1">
             <a:schemeClr val="accent1"/>
           </a:fillRef>
           <a:effectRef idx="0">
             <a:schemeClr val="accent1"/>
           </a:effectRef>
           <a:fontRef idx="minor">
-            <a:schemeClr val="tx1"/>
+            <a:schemeClr val="lt1"/>
           </a:fontRef>
         </p:style>
-      </p:cxnSp>
+        <p:txBody>
+          <a:bodyPr rtlCol="0" anchor="ctr"/>
+          <a:lstStyle/>
+          <a:p>
+            <a:pPr algn="ctr"/>
+            <a:endParaRPr lang="en-US" dirty="0"/>
+          </a:p>
+        </p:txBody>
+      </p:sp>
+      <p:sp>
+        <p:nvSpPr>
+          <p:cNvPr id="32" name="Rectangle 31">
+            <a:extLst>
+              <a:ext uri="{FF2B5EF4-FFF2-40B4-BE49-F238E27FC236}">
+                <a16:creationId xmlns:a16="http://schemas.microsoft.com/office/drawing/2014/main" id="{04357C93-F0CB-4A1C-8F77-4E9063789819}"/>
+              </a:ext>
+              <a:ext uri="{C183D7F6-B498-43B3-948B-1728B52AA6E4}">
+                <adec:decorative xmlns:adec="http://schemas.microsoft.com/office/drawing/2017/decorative" val="1"/>
+              </a:ext>
+            </a:extLst>
+          </p:cNvPr>
+          <p:cNvSpPr>
+            <a:spLocks noGrp="1" noRot="1" noChangeAspect="1" noMove="1" noResize="1" noEditPoints="1" noAdjustHandles="1" noChangeArrowheads="1" noChangeShapeType="1" noTextEdit="1"/>
+          </p:cNvSpPr>
+          <p:nvPr>
+            <p:extLst>
+              <p:ext uri="{386F3935-93C4-4BCD-93E2-E3B085C9AB24}">
+                <p16:designElem xmlns:p16="http://schemas.microsoft.com/office/powerpoint/2015/main" val="1"/>
+              </p:ext>
+            </p:extLst>
+          </p:nvPr>
+        </p:nvSpPr>
+        <p:spPr>
+          <a:xfrm>
+            <a:off x="302085" y="664308"/>
+            <a:ext cx="8082632" cy="5600340"/>
+          </a:xfrm>
+          <a:prstGeom prst="rect">
+            <a:avLst/>
+          </a:prstGeom>
+          <a:solidFill>
+            <a:schemeClr val="bg1"/>
+          </a:solidFill>
+          <a:ln>
+            <a:noFill/>
+          </a:ln>
+          <a:effectLst>
+            <a:outerShdw blurRad="139700" dist="127000" dir="5400000" algn="t" rotWithShape="0">
+              <a:prstClr val="black">
+                <a:alpha val="15000"/>
+              </a:prstClr>
+            </a:outerShdw>
+          </a:effectLst>
+        </p:spPr>
+        <p:style>
+          <a:lnRef idx="2">
+            <a:schemeClr val="accent1">
+              <a:shade val="50000"/>
+            </a:schemeClr>
+          </a:lnRef>
+          <a:fillRef idx="1">
+            <a:schemeClr val="accent1"/>
+          </a:fillRef>
+          <a:effectRef idx="0">
+            <a:schemeClr val="accent1"/>
+          </a:effectRef>
+          <a:fontRef idx="minor">
+            <a:schemeClr val="lt1"/>
+          </a:fontRef>
+        </p:style>
+        <p:txBody>
+          <a:bodyPr rtlCol="0" anchor="ctr"/>
+          <a:lstStyle/>
+          <a:p>
+            <a:pPr algn="ctr"/>
+            <a:endParaRPr lang="en-US"/>
+          </a:p>
+        </p:txBody>
+      </p:sp>
       <p:pic>
         <p:nvPicPr>
           <p:cNvPr id="7" name="Picture 6" descr="Table&#10;&#10;Description automatically generated">
@@ -6479,34 +7138,69 @@
               </a:ext>
             </a:extLst>
           </a:blip>
-          <a:srcRect l="9229"/>
+          <a:srcRect l="16037" r="10314" b="2"/>
           <a:stretch/>
         </p:blipFill>
         <p:spPr>
           <a:xfrm>
-            <a:off x="1317752" y="2426818"/>
-            <a:ext cx="3483547" cy="3997637"/>
+            <a:off x="545237" y="858525"/>
+            <a:ext cx="3685032" cy="5211906"/>
           </a:xfrm>
           <a:prstGeom prst="rect">
             <a:avLst/>
           </a:prstGeom>
         </p:spPr>
       </p:pic>
-      <p:cxnSp>
-        <p:nvCxnSpPr>
-          <p:cNvPr id="23" name="Straight Connector 22">
-            <a:extLst>
-              <a:ext uri="{FF2B5EF4-FFF2-40B4-BE49-F238E27FC236}">
-                <a16:creationId xmlns:a16="http://schemas.microsoft.com/office/drawing/2014/main" id="{DB146403-F3D6-484B-B2ED-97F9565D0370}"/>
+      <p:pic>
+        <p:nvPicPr>
+          <p:cNvPr id="5" name="Picture 4" descr="Graphical user interface&#10;&#10;Description automatically generated">
+            <a:extLst>
+              <a:ext uri="{FF2B5EF4-FFF2-40B4-BE49-F238E27FC236}">
+                <a16:creationId xmlns:a16="http://schemas.microsoft.com/office/drawing/2014/main" id="{573ED031-399F-E7C7-47BB-C81FD6FE5509}"/>
+              </a:ext>
+            </a:extLst>
+          </p:cNvPr>
+          <p:cNvPicPr>
+            <a:picLocks noChangeAspect="1"/>
+          </p:cNvPicPr>
+          <p:nvPr/>
+        </p:nvPicPr>
+        <p:blipFill rotWithShape="1">
+          <a:blip r:embed="rId3">
+            <a:extLst>
+              <a:ext uri="{28A0092B-C50C-407E-A947-70E740481C1C}">
+                <a14:useLocalDpi xmlns:a14="http://schemas.microsoft.com/office/drawing/2010/main" val="0"/>
+              </a:ext>
+            </a:extLst>
+          </a:blip>
+          <a:srcRect l="21327" r="30593" b="-2"/>
+          <a:stretch/>
+        </p:blipFill>
+        <p:spPr>
+          <a:xfrm>
+            <a:off x="4457706" y="858524"/>
+            <a:ext cx="3685032" cy="5211906"/>
+          </a:xfrm>
+          <a:prstGeom prst="rect">
+            <a:avLst/>
+          </a:prstGeom>
+        </p:spPr>
+      </p:pic>
+      <p:sp>
+        <p:nvSpPr>
+          <p:cNvPr id="34" name="Rectangle 33">
+            <a:extLst>
+              <a:ext uri="{FF2B5EF4-FFF2-40B4-BE49-F238E27FC236}">
+                <a16:creationId xmlns:a16="http://schemas.microsoft.com/office/drawing/2014/main" id="{90F533E9-6690-41A8-A372-4C6C622D028D}"/>
               </a:ext>
               <a:ext uri="{C183D7F6-B498-43B3-948B-1728B52AA6E4}">
                 <adec:decorative xmlns:adec="http://schemas.microsoft.com/office/drawing/2017/decorative" val="1"/>
               </a:ext>
             </a:extLst>
           </p:cNvPr>
-          <p:cNvCxnSpPr>
-            <a:cxnSpLocks noGrp="1" noRot="1" noChangeAspect="1" noMove="1" noResize="1" noEditPoints="1" noAdjustHandles="1" noChangeArrowheads="1" noChangeShapeType="1"/>
-          </p:cNvCxnSpPr>
+          <p:cNvSpPr>
+            <a:spLocks noGrp="1" noRot="1" noChangeAspect="1" noMove="1" noResize="1" noEditPoints="1" noAdjustHandles="1" noChangeArrowheads="1" noChangeShapeType="1" noTextEdit="1"/>
+          </p:cNvSpPr>
           <p:nvPr>
             <p:extLst>
               <p:ext uri="{386F3935-93C4-4BCD-93E2-E3B085C9AB24}">
@@ -6514,72 +7208,47 @@
               </p:ext>
             </p:extLst>
           </p:nvPr>
-        </p:nvCxnSpPr>
-        <p:spPr>
-          <a:xfrm>
-            <a:off x="6116278" y="2596836"/>
-            <a:ext cx="0" cy="3657600"/>
-          </a:xfrm>
-          <a:prstGeom prst="line">
+        </p:nvSpPr>
+        <p:spPr>
+          <a:xfrm rot="5400000">
+            <a:off x="7950447" y="3392097"/>
+            <a:ext cx="1719072" cy="152382"/>
+          </a:xfrm>
+          <a:prstGeom prst="rect">
             <a:avLst/>
           </a:prstGeom>
-          <a:ln w="101600" cmpd="dbl">
-            <a:solidFill>
-              <a:srgbClr val="595959"/>
-            </a:solidFill>
+          <a:solidFill>
+            <a:schemeClr val="accent4"/>
+          </a:solidFill>
+          <a:ln>
+            <a:noFill/>
           </a:ln>
         </p:spPr>
         <p:style>
-          <a:lnRef idx="1">
-            <a:schemeClr val="accent1"/>
+          <a:lnRef idx="2">
+            <a:schemeClr val="accent1">
+              <a:shade val="50000"/>
+            </a:schemeClr>
           </a:lnRef>
-          <a:fillRef idx="0">
+          <a:fillRef idx="1">
             <a:schemeClr val="accent1"/>
           </a:fillRef>
           <a:effectRef idx="0">
             <a:schemeClr val="accent1"/>
           </a:effectRef>
           <a:fontRef idx="minor">
-            <a:schemeClr val="tx1"/>
+            <a:schemeClr val="lt1"/>
           </a:fontRef>
         </p:style>
-      </p:cxnSp>
-      <p:pic>
-        <p:nvPicPr>
-          <p:cNvPr id="5" name="Picture 4" descr="Graphical user interface&#10;&#10;Description automatically generated">
-            <a:extLst>
-              <a:ext uri="{FF2B5EF4-FFF2-40B4-BE49-F238E27FC236}">
-                <a16:creationId xmlns:a16="http://schemas.microsoft.com/office/drawing/2014/main" id="{573ED031-399F-E7C7-47BB-C81FD6FE5509}"/>
-              </a:ext>
-            </a:extLst>
-          </p:cNvPr>
-          <p:cNvPicPr>
-            <a:picLocks noChangeAspect="1"/>
-          </p:cNvPicPr>
-          <p:nvPr/>
-        </p:nvPicPr>
-        <p:blipFill>
-          <a:blip r:embed="rId3">
-            <a:extLst>
-              <a:ext uri="{28A0092B-C50C-407E-A947-70E740481C1C}">
-                <a14:useLocalDpi xmlns:a14="http://schemas.microsoft.com/office/drawing/2010/main" val="0"/>
-              </a:ext>
-            </a:extLst>
-          </a:blip>
-          <a:stretch>
-            <a:fillRect/>
-          </a:stretch>
-        </p:blipFill>
-        <p:spPr>
-          <a:xfrm>
-            <a:off x="6445073" y="2570625"/>
-            <a:ext cx="5455917" cy="3710023"/>
-          </a:xfrm>
-          <a:prstGeom prst="rect">
-            <a:avLst/>
-          </a:prstGeom>
-        </p:spPr>
-      </p:pic>
+        <p:txBody>
+          <a:bodyPr rtlCol="0" anchor="ctr"/>
+          <a:lstStyle/>
+          <a:p>
+            <a:pPr algn="ctr"/>
+            <a:endParaRPr lang="en-US"/>
+          </a:p>
+        </p:txBody>
+      </p:sp>
     </p:spTree>
     <p:extLst>
       <p:ext uri="{BB962C8B-B14F-4D97-AF65-F5344CB8AC3E}">
@@ -6620,10 +7289,10 @@
       </p:grpSpPr>
       <p:sp useBgFill="1">
         <p:nvSpPr>
-          <p:cNvPr id="8" name="Rectangle 7">
-            <a:extLst>
-              <a:ext uri="{FF2B5EF4-FFF2-40B4-BE49-F238E27FC236}">
-                <a16:creationId xmlns:a16="http://schemas.microsoft.com/office/drawing/2014/main" id="{0671A8AE-40A1-4631-A6B8-581AFF065482}"/>
+          <p:cNvPr id="19" name="Rectangle 18">
+            <a:extLst>
+              <a:ext uri="{FF2B5EF4-FFF2-40B4-BE49-F238E27FC236}">
+                <a16:creationId xmlns:a16="http://schemas.microsoft.com/office/drawing/2014/main" id="{47942995-B07F-4636-9A06-C6A104B260A8}"/>
               </a:ext>
               <a:ext uri="{C183D7F6-B498-43B3-948B-1728B52AA6E4}">
                 <adec:decorative xmlns:adec="http://schemas.microsoft.com/office/drawing/2017/decorative" val="1"/>
@@ -6644,7 +7313,7 @@
         <p:spPr>
           <a:xfrm>
             <a:off x="0" y="0"/>
-            <a:ext cx="12192000" cy="6858000"/>
+            <a:ext cx="12191999" cy="6857365"/>
           </a:xfrm>
           <a:prstGeom prst="rect">
             <a:avLst/>
@@ -6678,50 +7347,63 @@
           </a:p>
         </p:txBody>
       </p:sp>
-      <p:pic>
-        <p:nvPicPr>
-          <p:cNvPr id="4" name="Picture 3" descr="Sticky notes with question marks">
-            <a:extLst>
-              <a:ext uri="{FF2B5EF4-FFF2-40B4-BE49-F238E27FC236}">
-                <a16:creationId xmlns:a16="http://schemas.microsoft.com/office/drawing/2014/main" id="{0E937CD3-8B80-264B-E56E-EC0BE557EAFC}"/>
-              </a:ext>
-            </a:extLst>
-          </p:cNvPr>
-          <p:cNvPicPr>
-            <a:picLocks noChangeAspect="1"/>
-          </p:cNvPicPr>
-          <p:nvPr/>
-        </p:nvPicPr>
-        <p:blipFill rotWithShape="1">
-          <a:blip r:embed="rId2"/>
-          <a:srcRect r="15627" b="-1"/>
-          <a:stretch/>
-        </p:blipFill>
-        <p:spPr>
-          <a:xfrm>
-            <a:off x="3523488" y="0"/>
-            <a:ext cx="8668512" cy="6857990"/>
-          </a:xfrm>
-          <a:prstGeom prst="rect">
-            <a:avLst/>
-          </a:prstGeom>
-        </p:spPr>
-      </p:pic>
-      <p:sp>
-        <p:nvSpPr>
-          <p:cNvPr id="11" name="Rectangle 9">
-            <a:extLst>
-              <a:ext uri="{FF2B5EF4-FFF2-40B4-BE49-F238E27FC236}">
-                <a16:creationId xmlns:a16="http://schemas.microsoft.com/office/drawing/2014/main" id="{AB58EF07-17C2-48CF-ABB0-EEF1F17CB8F0}"/>
+      <p:sp>
+        <p:nvSpPr>
+          <p:cNvPr id="2" name="Title 1">
+            <a:extLst>
+              <a:ext uri="{FF2B5EF4-FFF2-40B4-BE49-F238E27FC236}">
+                <a16:creationId xmlns:a16="http://schemas.microsoft.com/office/drawing/2014/main" id="{C78CF67C-3804-F0E4-FB4A-1F9996E3AB00}"/>
+              </a:ext>
+            </a:extLst>
+          </p:cNvPr>
+          <p:cNvSpPr>
+            <a:spLocks noGrp="1"/>
+          </p:cNvSpPr>
+          <p:nvPr>
+            <p:ph type="title"/>
+          </p:nvPr>
+        </p:nvSpPr>
+        <p:spPr>
+          <a:xfrm>
+            <a:off x="1113810" y="2960716"/>
+            <a:ext cx="4036334" cy="2387600"/>
+          </a:xfrm>
+        </p:spPr>
+        <p:txBody>
+          <a:bodyPr vert="horz" lIns="91440" tIns="45720" rIns="91440" bIns="45720" rtlCol="0" anchor="t">
+            <a:normAutofit/>
+          </a:bodyPr>
+          <a:lstStyle/>
+          <a:p>
+            <a:r>
+              <a:rPr lang="en-US" sz="5400" kern="1200">
+                <a:solidFill>
+                  <a:schemeClr val="tx1"/>
+                </a:solidFill>
+                <a:latin typeface="+mj-lt"/>
+                <a:ea typeface="+mj-ea"/>
+                <a:cs typeface="+mj-cs"/>
+              </a:rPr>
+              <a:t>Answer to Questions</a:t>
+            </a:r>
+          </a:p>
+        </p:txBody>
+      </p:sp>
+      <p:grpSp>
+        <p:nvGrpSpPr>
+          <p:cNvPr id="21" name="Group 20">
+            <a:extLst>
+              <a:ext uri="{FF2B5EF4-FFF2-40B4-BE49-F238E27FC236}">
+                <a16:creationId xmlns:a16="http://schemas.microsoft.com/office/drawing/2014/main" id="{032D8612-31EB-44CF-A1D0-14FD4C705424}"/>
               </a:ext>
               <a:ext uri="{C183D7F6-B498-43B3-948B-1728B52AA6E4}">
                 <adec:decorative xmlns:adec="http://schemas.microsoft.com/office/drawing/2017/decorative" val="1"/>
               </a:ext>
             </a:extLst>
           </p:cNvPr>
-          <p:cNvSpPr>
-            <a:spLocks noGrp="1" noRot="1" noChangeAspect="1" noMove="1" noResize="1" noEditPoints="1" noAdjustHandles="1" noChangeArrowheads="1" noChangeShapeType="1" noTextEdit="1"/>
-          </p:cNvSpPr>
+          <p:cNvGrpSpPr>
+            <a:grpSpLocks noGrp="1" noUngrp="1" noRot="1" noChangeAspect="1" noMove="1" noResize="1"/>
+          </p:cNvGrpSpPr>
           <p:nvPr>
             <p:extLst>
               <p:ext uri="{386F3935-93C4-4BCD-93E2-E3B085C9AB24}">
@@ -6729,36 +7411,230 @@
               </p:ext>
             </p:extLst>
           </p:nvPr>
-        </p:nvSpPr>
-        <p:spPr>
-          <a:xfrm>
-            <a:off x="3" y="0"/>
-            <a:ext cx="9339206" cy="6858000"/>
+        </p:nvGrpSpPr>
+        <p:grpSpPr>
+          <a:xfrm>
+            <a:off x="0" y="2984992"/>
+            <a:ext cx="731521" cy="673460"/>
+            <a:chOff x="3940602" y="308034"/>
+            <a:chExt cx="2116791" cy="3428999"/>
+          </a:xfrm>
+          <a:solidFill>
+            <a:schemeClr val="accent4"/>
+          </a:solidFill>
+        </p:grpSpPr>
+        <p:sp>
+          <p:nvSpPr>
+            <p:cNvPr id="22" name="Rectangle 21">
+              <a:extLst>
+                <a:ext uri="{FF2B5EF4-FFF2-40B4-BE49-F238E27FC236}">
+                  <a16:creationId xmlns:a16="http://schemas.microsoft.com/office/drawing/2014/main" id="{F19A4A0F-1B59-4DB0-9764-D10936E98770}"/>
+                </a:ext>
+                <a:ext uri="{C183D7F6-B498-43B3-948B-1728B52AA6E4}">
+                  <adec:decorative xmlns:adec="http://schemas.microsoft.com/office/drawing/2017/decorative" val="1"/>
+                </a:ext>
+              </a:extLst>
+            </p:cNvPr>
+            <p:cNvSpPr/>
+            <p:nvPr>
+              <p:extLst>
+                <p:ext uri="{386F3935-93C4-4BCD-93E2-E3B085C9AB24}">
+                  <p16:designElem xmlns:p16="http://schemas.microsoft.com/office/powerpoint/2015/main" val="1"/>
+                </p:ext>
+              </p:extLst>
+            </p:nvPr>
+          </p:nvSpPr>
+          <p:spPr>
+            <a:xfrm>
+              <a:off x="3940602" y="308034"/>
+              <a:ext cx="566743" cy="3428999"/>
+            </a:xfrm>
+            <a:prstGeom prst="rect">
+              <a:avLst/>
+            </a:prstGeom>
+            <a:grpFill/>
+            <a:ln>
+              <a:noFill/>
+            </a:ln>
+          </p:spPr>
+          <p:style>
+            <a:lnRef idx="2">
+              <a:schemeClr val="accent1">
+                <a:shade val="50000"/>
+              </a:schemeClr>
+            </a:lnRef>
+            <a:fillRef idx="1">
+              <a:schemeClr val="accent1"/>
+            </a:fillRef>
+            <a:effectRef idx="0">
+              <a:schemeClr val="accent1"/>
+            </a:effectRef>
+            <a:fontRef idx="minor">
+              <a:schemeClr val="lt1"/>
+            </a:fontRef>
+          </p:style>
+          <p:txBody>
+            <a:bodyPr rtlCol="0" anchor="ctr"/>
+            <a:lstStyle/>
+            <a:p>
+              <a:pPr algn="ctr"/>
+              <a:endParaRPr lang="en-US"/>
+            </a:p>
+          </p:txBody>
+        </p:sp>
+        <p:sp>
+          <p:nvSpPr>
+            <p:cNvPr id="23" name="Rectangle 22">
+              <a:extLst>
+                <a:ext uri="{FF2B5EF4-FFF2-40B4-BE49-F238E27FC236}">
+                  <a16:creationId xmlns:a16="http://schemas.microsoft.com/office/drawing/2014/main" id="{F399A70F-F8CD-4992-9EF5-6CF15472E73F}"/>
+                </a:ext>
+                <a:ext uri="{C183D7F6-B498-43B3-948B-1728B52AA6E4}">
+                  <adec:decorative xmlns:adec="http://schemas.microsoft.com/office/drawing/2017/decorative" val="1"/>
+                </a:ext>
+              </a:extLst>
+            </p:cNvPr>
+            <p:cNvSpPr/>
+            <p:nvPr>
+              <p:extLst>
+                <p:ext uri="{386F3935-93C4-4BCD-93E2-E3B085C9AB24}">
+                  <p16:designElem xmlns:p16="http://schemas.microsoft.com/office/powerpoint/2015/main" val="1"/>
+                </p:ext>
+              </p:extLst>
+            </p:nvPr>
+          </p:nvSpPr>
+          <p:spPr>
+            <a:xfrm>
+              <a:off x="4715626" y="308034"/>
+              <a:ext cx="566743" cy="3428999"/>
+            </a:xfrm>
+            <a:prstGeom prst="rect">
+              <a:avLst/>
+            </a:prstGeom>
+            <a:grpFill/>
+            <a:ln>
+              <a:noFill/>
+            </a:ln>
+          </p:spPr>
+          <p:style>
+            <a:lnRef idx="2">
+              <a:schemeClr val="accent1">
+                <a:shade val="50000"/>
+              </a:schemeClr>
+            </a:lnRef>
+            <a:fillRef idx="1">
+              <a:schemeClr val="accent1"/>
+            </a:fillRef>
+            <a:effectRef idx="0">
+              <a:schemeClr val="accent1"/>
+            </a:effectRef>
+            <a:fontRef idx="minor">
+              <a:schemeClr val="lt1"/>
+            </a:fontRef>
+          </p:style>
+          <p:txBody>
+            <a:bodyPr rtlCol="0" anchor="ctr"/>
+            <a:lstStyle/>
+            <a:p>
+              <a:pPr algn="ctr"/>
+              <a:endParaRPr lang="en-US"/>
+            </a:p>
+          </p:txBody>
+        </p:sp>
+        <p:sp>
+          <p:nvSpPr>
+            <p:cNvPr id="24" name="Rectangle 23">
+              <a:extLst>
+                <a:ext uri="{FF2B5EF4-FFF2-40B4-BE49-F238E27FC236}">
+                  <a16:creationId xmlns:a16="http://schemas.microsoft.com/office/drawing/2014/main" id="{48F4FEDC-6D80-458C-A665-075D9B9500FD}"/>
+                </a:ext>
+                <a:ext uri="{C183D7F6-B498-43B3-948B-1728B52AA6E4}">
+                  <adec:decorative xmlns:adec="http://schemas.microsoft.com/office/drawing/2017/decorative" val="1"/>
+                </a:ext>
+              </a:extLst>
+            </p:cNvPr>
+            <p:cNvSpPr/>
+            <p:nvPr>
+              <p:extLst>
+                <p:ext uri="{386F3935-93C4-4BCD-93E2-E3B085C9AB24}">
+                  <p16:designElem xmlns:p16="http://schemas.microsoft.com/office/powerpoint/2015/main" val="1"/>
+                </p:ext>
+              </p:extLst>
+            </p:nvPr>
+          </p:nvSpPr>
+          <p:spPr>
+            <a:xfrm>
+              <a:off x="5490650" y="308034"/>
+              <a:ext cx="566743" cy="3428999"/>
+            </a:xfrm>
+            <a:prstGeom prst="rect">
+              <a:avLst/>
+            </a:prstGeom>
+            <a:grpFill/>
+            <a:ln>
+              <a:noFill/>
+            </a:ln>
+          </p:spPr>
+          <p:style>
+            <a:lnRef idx="2">
+              <a:schemeClr val="accent1">
+                <a:shade val="50000"/>
+              </a:schemeClr>
+            </a:lnRef>
+            <a:fillRef idx="1">
+              <a:schemeClr val="accent1"/>
+            </a:fillRef>
+            <a:effectRef idx="0">
+              <a:schemeClr val="accent1"/>
+            </a:effectRef>
+            <a:fontRef idx="minor">
+              <a:schemeClr val="lt1"/>
+            </a:fontRef>
+          </p:style>
+          <p:txBody>
+            <a:bodyPr rtlCol="0" anchor="ctr"/>
+            <a:lstStyle/>
+            <a:p>
+              <a:pPr algn="ctr"/>
+              <a:endParaRPr lang="en-US"/>
+            </a:p>
+          </p:txBody>
+        </p:sp>
+      </p:grpSp>
+      <p:sp>
+        <p:nvSpPr>
+          <p:cNvPr id="26" name="Rectangle 25">
+            <a:extLst>
+              <a:ext uri="{FF2B5EF4-FFF2-40B4-BE49-F238E27FC236}">
+                <a16:creationId xmlns:a16="http://schemas.microsoft.com/office/drawing/2014/main" id="{B81933D1-5615-42C7-9C0B-4EB7105CCE2D}"/>
+              </a:ext>
+              <a:ext uri="{C183D7F6-B498-43B3-948B-1728B52AA6E4}">
+                <adec:decorative xmlns:adec="http://schemas.microsoft.com/office/drawing/2017/decorative" val="1"/>
+              </a:ext>
+            </a:extLst>
+          </p:cNvPr>
+          <p:cNvSpPr>
+            <a:spLocks noGrp="1" noRot="1" noChangeAspect="1" noMove="1" noResize="1" noEditPoints="1" noAdjustHandles="1" noChangeArrowheads="1" noChangeShapeType="1" noTextEdit="1"/>
+          </p:cNvSpPr>
+          <p:nvPr>
+            <p:extLst>
+              <p:ext uri="{386F3935-93C4-4BCD-93E2-E3B085C9AB24}">
+                <p16:designElem xmlns:p16="http://schemas.microsoft.com/office/powerpoint/2015/main" val="1"/>
+              </p:ext>
+            </p:extLst>
+          </p:nvPr>
+        </p:nvSpPr>
+        <p:spPr>
+          <a:xfrm flipH="1">
+            <a:off x="10697670" y="0"/>
+            <a:ext cx="1494330" cy="6858000"/>
           </a:xfrm>
           <a:prstGeom prst="rect">
             <a:avLst/>
           </a:prstGeom>
-          <a:gradFill>
-            <a:gsLst>
-              <a:gs pos="58000">
-                <a:schemeClr val="bg1"/>
-              </a:gs>
-              <a:gs pos="33000">
-                <a:schemeClr val="bg1">
-                  <a:alpha val="64000"/>
-                </a:schemeClr>
-              </a:gs>
-              <a:gs pos="0">
-                <a:schemeClr val="bg1">
-                  <a:alpha val="0"/>
-                </a:schemeClr>
-              </a:gs>
-              <a:gs pos="100000">
-                <a:schemeClr val="bg1"/>
-              </a:gs>
-            </a:gsLst>
-            <a:lin ang="10800000" scaled="0"/>
-          </a:gradFill>
+          <a:solidFill>
+            <a:schemeClr val="accent4"/>
+          </a:solidFill>
           <a:ln>
             <a:noFill/>
           </a:ln>
@@ -6784,51 +7660,16 @@
           <a:lstStyle/>
           <a:p>
             <a:pPr algn="ctr"/>
-            <a:endParaRPr lang="en-US" dirty="0"/>
-          </a:p>
-        </p:txBody>
-      </p:sp>
-      <p:sp>
-        <p:nvSpPr>
-          <p:cNvPr id="2" name="Title 1">
-            <a:extLst>
-              <a:ext uri="{FF2B5EF4-FFF2-40B4-BE49-F238E27FC236}">
-                <a16:creationId xmlns:a16="http://schemas.microsoft.com/office/drawing/2014/main" id="{C78CF67C-3804-F0E4-FB4A-1F9996E3AB00}"/>
-              </a:ext>
-            </a:extLst>
-          </p:cNvPr>
-          <p:cNvSpPr>
-            <a:spLocks noGrp="1"/>
-          </p:cNvSpPr>
-          <p:nvPr>
-            <p:ph type="title"/>
-          </p:nvPr>
-        </p:nvSpPr>
-        <p:spPr>
-          <a:xfrm>
-            <a:off x="477981" y="1122363"/>
-            <a:ext cx="4023360" cy="3204134"/>
-          </a:xfrm>
-        </p:spPr>
-        <p:txBody>
-          <a:bodyPr vert="horz" lIns="91440" tIns="45720" rIns="91440" bIns="45720" rtlCol="0" anchor="b">
-            <a:normAutofit/>
-          </a:bodyPr>
-          <a:lstStyle/>
-          <a:p>
-            <a:r>
-              <a:rPr lang="en-US" sz="4800"/>
-              <a:t>Answer to Questions</a:t>
-            </a:r>
-          </a:p>
-        </p:txBody>
-      </p:sp>
-      <p:sp>
-        <p:nvSpPr>
-          <p:cNvPr id="12" name="Rectangle 11">
-            <a:extLst>
-              <a:ext uri="{FF2B5EF4-FFF2-40B4-BE49-F238E27FC236}">
-                <a16:creationId xmlns:a16="http://schemas.microsoft.com/office/drawing/2014/main" id="{AF2F604E-43BE-4DC3-B983-E071523364F8}"/>
+            <a:endParaRPr lang="en-US"/>
+          </a:p>
+        </p:txBody>
+      </p:sp>
+      <p:sp>
+        <p:nvSpPr>
+          <p:cNvPr id="28" name="Rectangle 27">
+            <a:extLst>
+              <a:ext uri="{FF2B5EF4-FFF2-40B4-BE49-F238E27FC236}">
+                <a16:creationId xmlns:a16="http://schemas.microsoft.com/office/drawing/2014/main" id="{19C9EAEA-39D0-4B0E-A0EB-51E7B26740B1}"/>
               </a:ext>
               <a:ext uri="{C183D7F6-B498-43B3-948B-1728B52AA6E4}">
                 <adec:decorative xmlns:adec="http://schemas.microsoft.com/office/drawing/2017/decorative" val="1"/>
@@ -6847,19 +7688,26 @@
           </p:nvPr>
         </p:nvSpPr>
         <p:spPr>
-          <a:xfrm rot="5400000">
-            <a:off x="759921" y="346791"/>
-            <a:ext cx="146304" cy="704088"/>
+          <a:xfrm>
+            <a:off x="5685810" y="391886"/>
+            <a:ext cx="6009366" cy="6017078"/>
           </a:xfrm>
           <a:prstGeom prst="rect">
             <a:avLst/>
           </a:prstGeom>
           <a:solidFill>
-            <a:schemeClr val="accent2"/>
+            <a:schemeClr val="bg1"/>
           </a:solidFill>
           <a:ln>
             <a:noFill/>
           </a:ln>
+          <a:effectLst>
+            <a:outerShdw blurRad="139700" dist="127000" dir="5400000" algn="t" rotWithShape="0">
+              <a:prstClr val="black">
+                <a:alpha val="15000"/>
+              </a:prstClr>
+            </a:outerShdw>
+          </a:effectLst>
         </p:spPr>
         <p:style>
           <a:lnRef idx="2">
@@ -6882,108 +7730,39 @@
           <a:lstStyle/>
           <a:p>
             <a:pPr algn="ctr"/>
-            <a:endParaRPr lang="en-US">
-              <a:solidFill>
-                <a:prstClr val="white"/>
-              </a:solidFill>
-              <a:latin typeface="Calibri" panose="020F0502020204030204"/>
-            </a:endParaRPr>
-          </a:p>
-        </p:txBody>
-      </p:sp>
-      <p:sp>
-        <p:nvSpPr>
-          <p:cNvPr id="14" name="Rectangle 13">
-            <a:extLst>
-              <a:ext uri="{FF2B5EF4-FFF2-40B4-BE49-F238E27FC236}">
-                <a16:creationId xmlns:a16="http://schemas.microsoft.com/office/drawing/2014/main" id="{08C9B587-E65E-4B52-B37C-ABEBB6E87928}"/>
-              </a:ext>
-              <a:ext uri="{C183D7F6-B498-43B3-948B-1728B52AA6E4}">
-                <adec:decorative xmlns:adec="http://schemas.microsoft.com/office/drawing/2017/decorative" val="1"/>
-              </a:ext>
-            </a:extLst>
-          </p:cNvPr>
-          <p:cNvSpPr>
-            <a:spLocks noGrp="1" noRot="1" noChangeAspect="1" noMove="1" noResize="1" noEditPoints="1" noAdjustHandles="1" noChangeArrowheads="1" noChangeShapeType="1" noTextEdit="1"/>
-          </p:cNvSpPr>
-          <p:nvPr>
-            <p:extLst>
-              <p:ext uri="{386F3935-93C4-4BCD-93E2-E3B085C9AB24}">
-                <p16:designElem xmlns:p16="http://schemas.microsoft.com/office/powerpoint/2015/main" val="1"/>
-              </p:ext>
-            </p:extLst>
-          </p:nvPr>
-        </p:nvSpPr>
-        <p:spPr>
-          <a:xfrm>
-            <a:off x="481029" y="4546920"/>
-            <a:ext cx="3977640" cy="18288"/>
+            <a:endParaRPr lang="en-US"/>
+          </a:p>
+        </p:txBody>
+      </p:sp>
+      <p:pic>
+        <p:nvPicPr>
+          <p:cNvPr id="4" name="Picture 3" descr="Sticky notes with question marks">
+            <a:extLst>
+              <a:ext uri="{FF2B5EF4-FFF2-40B4-BE49-F238E27FC236}">
+                <a16:creationId xmlns:a16="http://schemas.microsoft.com/office/drawing/2014/main" id="{0E937CD3-8B80-264B-E56E-EC0BE557EAFC}"/>
+              </a:ext>
+            </a:extLst>
+          </p:cNvPr>
+          <p:cNvPicPr>
+            <a:picLocks noChangeAspect="1"/>
+          </p:cNvPicPr>
+          <p:nvPr/>
+        </p:nvPicPr>
+        <p:blipFill rotWithShape="1">
+          <a:blip r:embed="rId2"/>
+          <a:srcRect r="15627" b="-1"/>
+          <a:stretch/>
+        </p:blipFill>
+        <p:spPr>
+          <a:xfrm>
+            <a:off x="5922492" y="1209754"/>
+            <a:ext cx="5536001" cy="4379739"/>
           </a:xfrm>
           <a:prstGeom prst="rect">
             <a:avLst/>
           </a:prstGeom>
-          <a:solidFill>
-            <a:schemeClr val="tx1"/>
-          </a:solidFill>
-          <a:ln w="3175">
-            <a:noFill/>
-          </a:ln>
-          <a:effectLst/>
-        </p:spPr>
-        <p:style>
-          <a:lnRef idx="2">
-            <a:schemeClr val="accent1">
-              <a:shade val="50000"/>
-            </a:schemeClr>
-          </a:lnRef>
-          <a:fillRef idx="1">
-            <a:schemeClr val="accent1"/>
-          </a:fillRef>
-          <a:effectRef idx="0">
-            <a:schemeClr val="accent1"/>
-          </a:effectRef>
-          <a:fontRef idx="minor">
-            <a:schemeClr val="lt1"/>
-          </a:fontRef>
-        </p:style>
-        <p:txBody>
-          <a:bodyPr rtlCol="0" anchor="ctr"/>
-          <a:lstStyle/>
-          <a:p>
-            <a:pPr marL="0" marR="0" lvl="0" indent="0" algn="ctr" defTabSz="914400" rtl="0" eaLnBrk="1" fontAlgn="auto" latinLnBrk="0" hangingPunct="1">
-              <a:lnSpc>
-                <a:spcPct val="100000"/>
-              </a:lnSpc>
-              <a:spcBef>
-                <a:spcPts val="0"/>
-              </a:spcBef>
-              <a:spcAft>
-                <a:spcPts val="0"/>
-              </a:spcAft>
-              <a:buClrTx/>
-              <a:buSzTx/>
-              <a:buFontTx/>
-              <a:buNone/>
-              <a:tabLst/>
-              <a:defRPr/>
-            </a:pPr>
-            <a:endParaRPr kumimoji="0" lang="en-US" sz="1800" b="0" i="0" u="none" strike="noStrike" kern="1200" cap="none" spc="0" normalizeH="0" baseline="0" noProof="0">
-              <a:ln>
-                <a:noFill/>
-              </a:ln>
-              <a:solidFill>
-                <a:prstClr val="white"/>
-              </a:solidFill>
-              <a:effectLst/>
-              <a:uLnTx/>
-              <a:uFillTx/>
-              <a:latin typeface="Calibri" panose="020F0502020204030204"/>
-              <a:ea typeface="+mn-ea"/>
-              <a:cs typeface="+mn-cs"/>
-            </a:endParaRPr>
-          </a:p>
-        </p:txBody>
-      </p:sp>
+        </p:spPr>
+      </p:pic>
     </p:spTree>
     <p:extLst>
       <p:ext uri="{BB962C8B-B14F-4D97-AF65-F5344CB8AC3E}">
@@ -6992,7 +7771,7 @@
     </p:extLst>
   </p:cSld>
   <p:clrMapOvr>
-    <a:overrideClrMapping bg1="dk1" tx1="lt1" bg2="dk2" tx2="lt2" accent1="accent1" accent2="accent2" accent3="accent3" accent4="accent4" accent5="accent5" accent6="accent6" hlink="hlink" folHlink="folHlink"/>
+    <a:masterClrMapping/>
   </p:clrMapOvr>
 </p:sld>
 </file>
@@ -7000,6 +7779,14 @@
 <file path=ppt/slides/slide4.xml><?xml version="1.0" encoding="utf-8"?>
 <p:sld xmlns:a="http://schemas.openxmlformats.org/drawingml/2006/main" xmlns:r="http://schemas.openxmlformats.org/officeDocument/2006/relationships" xmlns:p="http://schemas.openxmlformats.org/presentationml/2006/main">
   <p:cSld>
+    <p:bg>
+      <p:bgPr>
+        <a:solidFill>
+          <a:schemeClr val="bg1"/>
+        </a:solidFill>
+        <a:effectLst/>
+      </p:bgPr>
+    </p:bg>
     <p:spTree>
       <p:nvGrpSpPr>
         <p:cNvPr id="1" name=""/>
@@ -7141,7 +7928,7 @@
           <p:nvPr/>
         </p:nvPicPr>
         <p:blipFill rotWithShape="1">
-          <a:blip r:embed="rId2">
+          <a:blip r:embed="rId3">
             <a:extLst>
               <a:ext uri="{28A0092B-C50C-407E-A947-70E740481C1C}">
                 <a14:useLocalDpi xmlns:a14="http://schemas.microsoft.com/office/drawing/2010/main" val="0"/>
@@ -7181,7 +7968,7 @@
           <p:nvPr/>
         </p:nvPicPr>
         <p:blipFill rotWithShape="1">
-          <a:blip r:embed="rId3">
+          <a:blip r:embed="rId4">
             <a:extLst>
               <a:ext uri="{28A0092B-C50C-407E-A947-70E740481C1C}">
                 <a14:useLocalDpi xmlns:a14="http://schemas.microsoft.com/office/drawing/2010/main" val="0"/>
@@ -7434,7 +8221,7 @@
     </p:extLst>
   </p:cSld>
   <p:clrMapOvr>
-    <a:masterClrMapping/>
+    <a:overrideClrMapping bg1="lt1" tx1="dk1" bg2="lt2" tx2="dk2" accent1="accent1" accent2="accent2" accent3="accent3" accent4="accent4" accent5="accent5" accent6="accent6" hlink="hlink" folHlink="folHlink"/>
   </p:clrMapOvr>
 </p:sld>
 </file>
@@ -9936,4 +10723,47 @@
     </a:ext>
   </a:extLst>
 </a:theme>
+</file>
+
+<file path=ppt/theme/themeOverride1.xml><?xml version="1.0" encoding="utf-8"?>
+<a:themeOverride xmlns:a="http://schemas.openxmlformats.org/drawingml/2006/main">
+  <a:clrScheme name="Office">
+    <a:dk1>
+      <a:sysClr val="windowText" lastClr="000000"/>
+    </a:dk1>
+    <a:lt1>
+      <a:sysClr val="window" lastClr="FFFFFF"/>
+    </a:lt1>
+    <a:dk2>
+      <a:srgbClr val="44546A"/>
+    </a:dk2>
+    <a:lt2>
+      <a:srgbClr val="E7E6E6"/>
+    </a:lt2>
+    <a:accent1>
+      <a:srgbClr val="4472C4"/>
+    </a:accent1>
+    <a:accent2>
+      <a:srgbClr val="ED7D31"/>
+    </a:accent2>
+    <a:accent3>
+      <a:srgbClr val="A5A5A5"/>
+    </a:accent3>
+    <a:accent4>
+      <a:srgbClr val="FFC000"/>
+    </a:accent4>
+    <a:accent5>
+      <a:srgbClr val="5B9BD5"/>
+    </a:accent5>
+    <a:accent6>
+      <a:srgbClr val="70AD47"/>
+    </a:accent6>
+    <a:hlink>
+      <a:srgbClr val="0563C1"/>
+    </a:hlink>
+    <a:folHlink>
+      <a:srgbClr val="954F72"/>
+    </a:folHlink>
+  </a:clrScheme>
+</a:themeOverride>
 </file>
</xml_diff>